<commit_message>
draft of presentation finished
</commit_message>
<xml_diff>
--- a/presentation/PDM_presentation_v0.0.1.pptx
+++ b/presentation/PDM_presentation_v0.0.1.pptx
@@ -6,6 +6,38 @@
   </p:sldMasterIdLst>
   <p:sldIdLst>
     <p:sldId id="256" r:id="rId2"/>
+    <p:sldId id="257" r:id="rId3"/>
+    <p:sldId id="258" r:id="rId4"/>
+    <p:sldId id="259" r:id="rId5"/>
+    <p:sldId id="278" r:id="rId6"/>
+    <p:sldId id="276" r:id="rId7"/>
+    <p:sldId id="279" r:id="rId8"/>
+    <p:sldId id="280" r:id="rId9"/>
+    <p:sldId id="281" r:id="rId10"/>
+    <p:sldId id="277" r:id="rId11"/>
+    <p:sldId id="282" r:id="rId12"/>
+    <p:sldId id="283" r:id="rId13"/>
+    <p:sldId id="284" r:id="rId14"/>
+    <p:sldId id="285" r:id="rId15"/>
+    <p:sldId id="260" r:id="rId16"/>
+    <p:sldId id="261" r:id="rId17"/>
+    <p:sldId id="267" r:id="rId18"/>
+    <p:sldId id="266" r:id="rId19"/>
+    <p:sldId id="268" r:id="rId20"/>
+    <p:sldId id="265" r:id="rId21"/>
+    <p:sldId id="264" r:id="rId22"/>
+    <p:sldId id="262" r:id="rId23"/>
+    <p:sldId id="263" r:id="rId24"/>
+    <p:sldId id="286" r:id="rId25"/>
+    <p:sldId id="287" r:id="rId26"/>
+    <p:sldId id="269" r:id="rId27"/>
+    <p:sldId id="272" r:id="rId28"/>
+    <p:sldId id="273" r:id="rId29"/>
+    <p:sldId id="288" r:id="rId30"/>
+    <p:sldId id="270" r:id="rId31"/>
+    <p:sldId id="271" r:id="rId32"/>
+    <p:sldId id="274" r:id="rId33"/>
+    <p:sldId id="275" r:id="rId34"/>
   </p:sldIdLst>
   <p:sldSz cx="12192000" cy="6858000"/>
   <p:notesSz cx="6858000" cy="9144000"/>
@@ -270,7 +302,7 @@
           <a:p>
             <a:fld id="{CC7AE545-A086-6C4C-B907-7F37BFAE724E}" type="datetimeFigureOut">
               <a:rPr lang="de-DE" smtClean="0"/>
-              <a:t>09.07.21</a:t>
+              <a:t>12.07.21</a:t>
             </a:fld>
             <a:endParaRPr lang="de-DE"/>
           </a:p>
@@ -468,7 +500,7 @@
           <a:p>
             <a:fld id="{CC7AE545-A086-6C4C-B907-7F37BFAE724E}" type="datetimeFigureOut">
               <a:rPr lang="de-DE" smtClean="0"/>
-              <a:t>09.07.21</a:t>
+              <a:t>12.07.21</a:t>
             </a:fld>
             <a:endParaRPr lang="de-DE"/>
           </a:p>
@@ -676,7 +708,7 @@
           <a:p>
             <a:fld id="{CC7AE545-A086-6C4C-B907-7F37BFAE724E}" type="datetimeFigureOut">
               <a:rPr lang="de-DE" smtClean="0"/>
-              <a:t>09.07.21</a:t>
+              <a:t>12.07.21</a:t>
             </a:fld>
             <a:endParaRPr lang="de-DE"/>
           </a:p>
@@ -874,7 +906,7 @@
           <a:p>
             <a:fld id="{CC7AE545-A086-6C4C-B907-7F37BFAE724E}" type="datetimeFigureOut">
               <a:rPr lang="de-DE" smtClean="0"/>
-              <a:t>09.07.21</a:t>
+              <a:t>12.07.21</a:t>
             </a:fld>
             <a:endParaRPr lang="de-DE"/>
           </a:p>
@@ -934,6 +966,66 @@
           </a:p>
         </p:txBody>
       </p:sp>
+      <p:pic>
+        <p:nvPicPr>
+          <p:cNvPr id="9" name="Grafik 8">
+            <a:extLst>
+              <a:ext uri="{FF2B5EF4-FFF2-40B4-BE49-F238E27FC236}">
+                <a16:creationId xmlns:a16="http://schemas.microsoft.com/office/drawing/2014/main" id="{6E20E86F-2ECC-5645-B7EE-07A49518B6D1}"/>
+              </a:ext>
+            </a:extLst>
+          </p:cNvPr>
+          <p:cNvPicPr>
+            <a:picLocks noChangeAspect="1"/>
+          </p:cNvPicPr>
+          <p:nvPr userDrawn="1"/>
+        </p:nvPicPr>
+        <p:blipFill>
+          <a:blip r:embed="rId2"/>
+          <a:stretch>
+            <a:fillRect/>
+          </a:stretch>
+        </p:blipFill>
+        <p:spPr>
+          <a:xfrm>
+            <a:off x="0" y="0"/>
+            <a:ext cx="1573608" cy="681037"/>
+          </a:xfrm>
+          <a:prstGeom prst="rect">
+            <a:avLst/>
+          </a:prstGeom>
+        </p:spPr>
+      </p:pic>
+      <p:pic>
+        <p:nvPicPr>
+          <p:cNvPr id="19" name="Grafik 18" descr="Ein Bild, das Text enthält.&#10;&#10;Automatisch generierte Beschreibung">
+            <a:extLst>
+              <a:ext uri="{FF2B5EF4-FFF2-40B4-BE49-F238E27FC236}">
+                <a16:creationId xmlns:a16="http://schemas.microsoft.com/office/drawing/2014/main" id="{5F56A915-E7F7-A94D-9F2C-BD7ED427BEAD}"/>
+              </a:ext>
+            </a:extLst>
+          </p:cNvPr>
+          <p:cNvPicPr>
+            <a:picLocks noChangeAspect="1"/>
+          </p:cNvPicPr>
+          <p:nvPr userDrawn="1"/>
+        </p:nvPicPr>
+        <p:blipFill>
+          <a:blip r:embed="rId3"/>
+          <a:stretch>
+            <a:fillRect/>
+          </a:stretch>
+        </p:blipFill>
+        <p:spPr>
+          <a:xfrm>
+            <a:off x="281682" y="5971382"/>
+            <a:ext cx="1113035" cy="681036"/>
+          </a:xfrm>
+          <a:prstGeom prst="rect">
+            <a:avLst/>
+          </a:prstGeom>
+        </p:spPr>
+      </p:pic>
     </p:spTree>
     <p:extLst>
       <p:ext uri="{BB962C8B-B14F-4D97-AF65-F5344CB8AC3E}">
@@ -1149,7 +1241,7 @@
           <a:p>
             <a:fld id="{CC7AE545-A086-6C4C-B907-7F37BFAE724E}" type="datetimeFigureOut">
               <a:rPr lang="de-DE" smtClean="0"/>
-              <a:t>09.07.21</a:t>
+              <a:t>12.07.21</a:t>
             </a:fld>
             <a:endParaRPr lang="de-DE"/>
           </a:p>
@@ -1414,7 +1506,7 @@
           <a:p>
             <a:fld id="{CC7AE545-A086-6C4C-B907-7F37BFAE724E}" type="datetimeFigureOut">
               <a:rPr lang="de-DE" smtClean="0"/>
-              <a:t>09.07.21</a:t>
+              <a:t>12.07.21</a:t>
             </a:fld>
             <a:endParaRPr lang="de-DE"/>
           </a:p>
@@ -1826,7 +1918,7 @@
           <a:p>
             <a:fld id="{CC7AE545-A086-6C4C-B907-7F37BFAE724E}" type="datetimeFigureOut">
               <a:rPr lang="de-DE" smtClean="0"/>
-              <a:t>09.07.21</a:t>
+              <a:t>12.07.21</a:t>
             </a:fld>
             <a:endParaRPr lang="de-DE"/>
           </a:p>
@@ -1967,7 +2059,7 @@
           <a:p>
             <a:fld id="{CC7AE545-A086-6C4C-B907-7F37BFAE724E}" type="datetimeFigureOut">
               <a:rPr lang="de-DE" smtClean="0"/>
-              <a:t>09.07.21</a:t>
+              <a:t>12.07.21</a:t>
             </a:fld>
             <a:endParaRPr lang="de-DE"/>
           </a:p>
@@ -2080,7 +2172,7 @@
           <a:p>
             <a:fld id="{CC7AE545-A086-6C4C-B907-7F37BFAE724E}" type="datetimeFigureOut">
               <a:rPr lang="de-DE" smtClean="0"/>
-              <a:t>09.07.21</a:t>
+              <a:t>12.07.21</a:t>
             </a:fld>
             <a:endParaRPr lang="de-DE"/>
           </a:p>
@@ -2391,7 +2483,7 @@
           <a:p>
             <a:fld id="{CC7AE545-A086-6C4C-B907-7F37BFAE724E}" type="datetimeFigureOut">
               <a:rPr lang="de-DE" smtClean="0"/>
-              <a:t>09.07.21</a:t>
+              <a:t>12.07.21</a:t>
             </a:fld>
             <a:endParaRPr lang="de-DE"/>
           </a:p>
@@ -2679,7 +2771,7 @@
           <a:p>
             <a:fld id="{CC7AE545-A086-6C4C-B907-7F37BFAE724E}" type="datetimeFigureOut">
               <a:rPr lang="de-DE" smtClean="0"/>
-              <a:t>09.07.21</a:t>
+              <a:t>12.07.21</a:t>
             </a:fld>
             <a:endParaRPr lang="de-DE"/>
           </a:p>
@@ -2920,7 +3012,7 @@
           <a:p>
             <a:fld id="{CC7AE545-A086-6C4C-B907-7F37BFAE724E}" type="datetimeFigureOut">
               <a:rPr lang="de-DE" smtClean="0"/>
-              <a:t>09.07.21</a:t>
+              <a:t>12.07.21</a:t>
             </a:fld>
             <a:endParaRPr lang="de-DE"/>
           </a:p>
@@ -3433,6 +3525,3562 @@
 </p:sld>
 </file>
 
+<file path=ppt/slides/slide10.xml><?xml version="1.0" encoding="utf-8"?>
+<p:sld xmlns:a="http://schemas.openxmlformats.org/drawingml/2006/main" xmlns:r="http://schemas.openxmlformats.org/officeDocument/2006/relationships" xmlns:p="http://schemas.openxmlformats.org/presentationml/2006/main">
+  <p:cSld>
+    <p:spTree>
+      <p:nvGrpSpPr>
+        <p:cNvPr id="1" name=""/>
+        <p:cNvGrpSpPr/>
+        <p:nvPr/>
+      </p:nvGrpSpPr>
+      <p:grpSpPr>
+        <a:xfrm>
+          <a:off x="0" y="0"/>
+          <a:ext cx="0" cy="0"/>
+          <a:chOff x="0" y="0"/>
+          <a:chExt cx="0" cy="0"/>
+        </a:xfrm>
+      </p:grpSpPr>
+      <p:sp>
+        <p:nvSpPr>
+          <p:cNvPr id="2" name="Titel 1">
+            <a:extLst>
+              <a:ext uri="{FF2B5EF4-FFF2-40B4-BE49-F238E27FC236}">
+                <a16:creationId xmlns:a16="http://schemas.microsoft.com/office/drawing/2014/main" id="{78A22220-7016-7E4C-B6FE-C01B3FF954D7}"/>
+              </a:ext>
+            </a:extLst>
+          </p:cNvPr>
+          <p:cNvSpPr>
+            <a:spLocks noGrp="1"/>
+          </p:cNvSpPr>
+          <p:nvPr>
+            <p:ph type="title"/>
+          </p:nvPr>
+        </p:nvSpPr>
+        <p:spPr/>
+        <p:txBody>
+          <a:bodyPr/>
+          <a:lstStyle/>
+          <a:p>
+            <a:pPr algn="ctr"/>
+            <a:r>
+              <a:rPr lang="de-DE" dirty="0"/>
+              <a:t>Twitter</a:t>
+            </a:r>
+          </a:p>
+        </p:txBody>
+      </p:sp>
+      <p:pic>
+        <p:nvPicPr>
+          <p:cNvPr id="13" name="Inhaltsplatzhalter 12" descr="Ein Bild, das Text enthält.&#10;&#10;Automatisch generierte Beschreibung">
+            <a:extLst>
+              <a:ext uri="{FF2B5EF4-FFF2-40B4-BE49-F238E27FC236}">
+                <a16:creationId xmlns:a16="http://schemas.microsoft.com/office/drawing/2014/main" id="{024B005E-49AA-F840-BDA7-121BBE93EDA8}"/>
+              </a:ext>
+            </a:extLst>
+          </p:cNvPr>
+          <p:cNvPicPr>
+            <a:picLocks noGrp="1" noChangeAspect="1"/>
+          </p:cNvPicPr>
+          <p:nvPr>
+            <p:ph idx="1"/>
+          </p:nvPr>
+        </p:nvPicPr>
+        <p:blipFill>
+          <a:blip r:embed="rId2"/>
+          <a:stretch>
+            <a:fillRect/>
+          </a:stretch>
+        </p:blipFill>
+        <p:spPr>
+          <a:xfrm rot="21007189">
+            <a:off x="2266950" y="2764631"/>
+            <a:ext cx="7658100" cy="2133600"/>
+          </a:xfrm>
+        </p:spPr>
+      </p:pic>
+      <p:pic>
+        <p:nvPicPr>
+          <p:cNvPr id="15" name="Grafik 14" descr="Ein Bild, das Text enthält.&#10;&#10;Automatisch generierte Beschreibung">
+            <a:extLst>
+              <a:ext uri="{FF2B5EF4-FFF2-40B4-BE49-F238E27FC236}">
+                <a16:creationId xmlns:a16="http://schemas.microsoft.com/office/drawing/2014/main" id="{843FCEBB-98C5-3D44-B58D-170C7967C8D6}"/>
+              </a:ext>
+            </a:extLst>
+          </p:cNvPr>
+          <p:cNvPicPr>
+            <a:picLocks noChangeAspect="1"/>
+          </p:cNvPicPr>
+          <p:nvPr/>
+        </p:nvPicPr>
+        <p:blipFill>
+          <a:blip r:embed="rId3"/>
+          <a:stretch>
+            <a:fillRect/>
+          </a:stretch>
+        </p:blipFill>
+        <p:spPr>
+          <a:xfrm rot="834556">
+            <a:off x="2060450" y="3383980"/>
+            <a:ext cx="7658100" cy="1760390"/>
+          </a:xfrm>
+          <a:prstGeom prst="rect">
+            <a:avLst/>
+          </a:prstGeom>
+        </p:spPr>
+      </p:pic>
+      <p:pic>
+        <p:nvPicPr>
+          <p:cNvPr id="17" name="Grafik 16" descr="Ein Bild, das Text enthält.&#10;&#10;Automatisch generierte Beschreibung">
+            <a:extLst>
+              <a:ext uri="{FF2B5EF4-FFF2-40B4-BE49-F238E27FC236}">
+                <a16:creationId xmlns:a16="http://schemas.microsoft.com/office/drawing/2014/main" id="{4E501874-F6B4-B140-9611-03410EC22953}"/>
+              </a:ext>
+            </a:extLst>
+          </p:cNvPr>
+          <p:cNvPicPr>
+            <a:picLocks noChangeAspect="1"/>
+          </p:cNvPicPr>
+          <p:nvPr/>
+        </p:nvPicPr>
+        <p:blipFill>
+          <a:blip r:embed="rId4"/>
+          <a:stretch>
+            <a:fillRect/>
+          </a:stretch>
+        </p:blipFill>
+        <p:spPr>
+          <a:xfrm rot="21348032">
+            <a:off x="2140689" y="2890519"/>
+            <a:ext cx="7658100" cy="2044700"/>
+          </a:xfrm>
+          <a:prstGeom prst="rect">
+            <a:avLst/>
+          </a:prstGeom>
+        </p:spPr>
+      </p:pic>
+      <p:pic>
+        <p:nvPicPr>
+          <p:cNvPr id="19" name="Grafik 18" descr="Ein Bild, das Text enthält.&#10;&#10;Automatisch generierte Beschreibung">
+            <a:extLst>
+              <a:ext uri="{FF2B5EF4-FFF2-40B4-BE49-F238E27FC236}">
+                <a16:creationId xmlns:a16="http://schemas.microsoft.com/office/drawing/2014/main" id="{8AE44153-1E25-CB46-8409-D0B3F81A3DA8}"/>
+              </a:ext>
+            </a:extLst>
+          </p:cNvPr>
+          <p:cNvPicPr>
+            <a:picLocks noChangeAspect="1"/>
+          </p:cNvPicPr>
+          <p:nvPr/>
+        </p:nvPicPr>
+        <p:blipFill>
+          <a:blip r:embed="rId5"/>
+          <a:stretch>
+            <a:fillRect/>
+          </a:stretch>
+        </p:blipFill>
+        <p:spPr>
+          <a:xfrm rot="20185687">
+            <a:off x="2182517" y="3295381"/>
+            <a:ext cx="7658100" cy="1387180"/>
+          </a:xfrm>
+          <a:prstGeom prst="rect">
+            <a:avLst/>
+          </a:prstGeom>
+        </p:spPr>
+      </p:pic>
+    </p:spTree>
+    <p:extLst>
+      <p:ext uri="{BB962C8B-B14F-4D97-AF65-F5344CB8AC3E}">
+        <p14:creationId xmlns:p14="http://schemas.microsoft.com/office/powerpoint/2010/main" val="1998526767"/>
+      </p:ext>
+    </p:extLst>
+  </p:cSld>
+  <p:clrMapOvr>
+    <a:masterClrMapping/>
+  </p:clrMapOvr>
+  <p:timing>
+    <p:tnLst>
+      <p:par>
+        <p:cTn id="1" dur="indefinite" restart="never" nodeType="tmRoot">
+          <p:childTnLst>
+            <p:seq concurrent="1" nextAc="seek">
+              <p:cTn id="2" dur="indefinite" nodeType="mainSeq">
+                <p:childTnLst>
+                  <p:par>
+                    <p:cTn id="3" fill="hold">
+                      <p:stCondLst>
+                        <p:cond delay="indefinite"/>
+                      </p:stCondLst>
+                      <p:childTnLst>
+                        <p:par>
+                          <p:cTn id="4" fill="hold">
+                            <p:stCondLst>
+                              <p:cond delay="0"/>
+                            </p:stCondLst>
+                            <p:childTnLst>
+                              <p:par>
+                                <p:cTn id="5" presetID="23" presetClass="entr" presetSubtype="32" fill="hold" nodeType="clickEffect">
+                                  <p:stCondLst>
+                                    <p:cond delay="0"/>
+                                  </p:stCondLst>
+                                  <p:childTnLst>
+                                    <p:set>
+                                      <p:cBhvr>
+                                        <p:cTn id="6" dur="1" fill="hold">
+                                          <p:stCondLst>
+                                            <p:cond delay="0"/>
+                                          </p:stCondLst>
+                                        </p:cTn>
+                                        <p:tgtEl>
+                                          <p:spTgt spid="13"/>
+                                        </p:tgtEl>
+                                        <p:attrNameLst>
+                                          <p:attrName>style.visibility</p:attrName>
+                                        </p:attrNameLst>
+                                      </p:cBhvr>
+                                      <p:to>
+                                        <p:strVal val="visible"/>
+                                      </p:to>
+                                    </p:set>
+                                    <p:anim calcmode="lin" valueType="num">
+                                      <p:cBhvr>
+                                        <p:cTn id="7" dur="500" fill="hold"/>
+                                        <p:tgtEl>
+                                          <p:spTgt spid="13"/>
+                                        </p:tgtEl>
+                                        <p:attrNameLst>
+                                          <p:attrName>ppt_w</p:attrName>
+                                        </p:attrNameLst>
+                                      </p:cBhvr>
+                                      <p:tavLst>
+                                        <p:tav tm="0">
+                                          <p:val>
+                                            <p:strVal val="4*#ppt_w"/>
+                                          </p:val>
+                                        </p:tav>
+                                        <p:tav tm="100000">
+                                          <p:val>
+                                            <p:strVal val="#ppt_w"/>
+                                          </p:val>
+                                        </p:tav>
+                                      </p:tavLst>
+                                    </p:anim>
+                                    <p:anim calcmode="lin" valueType="num">
+                                      <p:cBhvr>
+                                        <p:cTn id="8" dur="500" fill="hold"/>
+                                        <p:tgtEl>
+                                          <p:spTgt spid="13"/>
+                                        </p:tgtEl>
+                                        <p:attrNameLst>
+                                          <p:attrName>ppt_h</p:attrName>
+                                        </p:attrNameLst>
+                                      </p:cBhvr>
+                                      <p:tavLst>
+                                        <p:tav tm="0">
+                                          <p:val>
+                                            <p:strVal val="4*#ppt_h"/>
+                                          </p:val>
+                                        </p:tav>
+                                        <p:tav tm="100000">
+                                          <p:val>
+                                            <p:strVal val="#ppt_h"/>
+                                          </p:val>
+                                        </p:tav>
+                                      </p:tavLst>
+                                    </p:anim>
+                                  </p:childTnLst>
+                                </p:cTn>
+                              </p:par>
+                            </p:childTnLst>
+                          </p:cTn>
+                        </p:par>
+                      </p:childTnLst>
+                    </p:cTn>
+                  </p:par>
+                  <p:par>
+                    <p:cTn id="9" fill="hold">
+                      <p:stCondLst>
+                        <p:cond delay="indefinite"/>
+                      </p:stCondLst>
+                      <p:childTnLst>
+                        <p:par>
+                          <p:cTn id="10" fill="hold">
+                            <p:stCondLst>
+                              <p:cond delay="0"/>
+                            </p:stCondLst>
+                            <p:childTnLst>
+                              <p:par>
+                                <p:cTn id="11" presetID="23" presetClass="entr" presetSubtype="32" fill="hold" nodeType="clickEffect">
+                                  <p:stCondLst>
+                                    <p:cond delay="0"/>
+                                  </p:stCondLst>
+                                  <p:childTnLst>
+                                    <p:set>
+                                      <p:cBhvr>
+                                        <p:cTn id="12" dur="1" fill="hold">
+                                          <p:stCondLst>
+                                            <p:cond delay="0"/>
+                                          </p:stCondLst>
+                                        </p:cTn>
+                                        <p:tgtEl>
+                                          <p:spTgt spid="15"/>
+                                        </p:tgtEl>
+                                        <p:attrNameLst>
+                                          <p:attrName>style.visibility</p:attrName>
+                                        </p:attrNameLst>
+                                      </p:cBhvr>
+                                      <p:to>
+                                        <p:strVal val="visible"/>
+                                      </p:to>
+                                    </p:set>
+                                    <p:anim calcmode="lin" valueType="num">
+                                      <p:cBhvr>
+                                        <p:cTn id="13" dur="500" fill="hold"/>
+                                        <p:tgtEl>
+                                          <p:spTgt spid="15"/>
+                                        </p:tgtEl>
+                                        <p:attrNameLst>
+                                          <p:attrName>ppt_w</p:attrName>
+                                        </p:attrNameLst>
+                                      </p:cBhvr>
+                                      <p:tavLst>
+                                        <p:tav tm="0">
+                                          <p:val>
+                                            <p:strVal val="4*#ppt_w"/>
+                                          </p:val>
+                                        </p:tav>
+                                        <p:tav tm="100000">
+                                          <p:val>
+                                            <p:strVal val="#ppt_w"/>
+                                          </p:val>
+                                        </p:tav>
+                                      </p:tavLst>
+                                    </p:anim>
+                                    <p:anim calcmode="lin" valueType="num">
+                                      <p:cBhvr>
+                                        <p:cTn id="14" dur="500" fill="hold"/>
+                                        <p:tgtEl>
+                                          <p:spTgt spid="15"/>
+                                        </p:tgtEl>
+                                        <p:attrNameLst>
+                                          <p:attrName>ppt_h</p:attrName>
+                                        </p:attrNameLst>
+                                      </p:cBhvr>
+                                      <p:tavLst>
+                                        <p:tav tm="0">
+                                          <p:val>
+                                            <p:strVal val="4*#ppt_h"/>
+                                          </p:val>
+                                        </p:tav>
+                                        <p:tav tm="100000">
+                                          <p:val>
+                                            <p:strVal val="#ppt_h"/>
+                                          </p:val>
+                                        </p:tav>
+                                      </p:tavLst>
+                                    </p:anim>
+                                  </p:childTnLst>
+                                </p:cTn>
+                              </p:par>
+                            </p:childTnLst>
+                          </p:cTn>
+                        </p:par>
+                      </p:childTnLst>
+                    </p:cTn>
+                  </p:par>
+                  <p:par>
+                    <p:cTn id="15" fill="hold">
+                      <p:stCondLst>
+                        <p:cond delay="indefinite"/>
+                      </p:stCondLst>
+                      <p:childTnLst>
+                        <p:par>
+                          <p:cTn id="16" fill="hold">
+                            <p:stCondLst>
+                              <p:cond delay="0"/>
+                            </p:stCondLst>
+                            <p:childTnLst>
+                              <p:par>
+                                <p:cTn id="17" presetID="23" presetClass="entr" presetSubtype="32" fill="hold" nodeType="clickEffect">
+                                  <p:stCondLst>
+                                    <p:cond delay="0"/>
+                                  </p:stCondLst>
+                                  <p:childTnLst>
+                                    <p:set>
+                                      <p:cBhvr>
+                                        <p:cTn id="18" dur="1" fill="hold">
+                                          <p:stCondLst>
+                                            <p:cond delay="0"/>
+                                          </p:stCondLst>
+                                        </p:cTn>
+                                        <p:tgtEl>
+                                          <p:spTgt spid="17"/>
+                                        </p:tgtEl>
+                                        <p:attrNameLst>
+                                          <p:attrName>style.visibility</p:attrName>
+                                        </p:attrNameLst>
+                                      </p:cBhvr>
+                                      <p:to>
+                                        <p:strVal val="visible"/>
+                                      </p:to>
+                                    </p:set>
+                                    <p:anim calcmode="lin" valueType="num">
+                                      <p:cBhvr>
+                                        <p:cTn id="19" dur="500" fill="hold"/>
+                                        <p:tgtEl>
+                                          <p:spTgt spid="17"/>
+                                        </p:tgtEl>
+                                        <p:attrNameLst>
+                                          <p:attrName>ppt_w</p:attrName>
+                                        </p:attrNameLst>
+                                      </p:cBhvr>
+                                      <p:tavLst>
+                                        <p:tav tm="0">
+                                          <p:val>
+                                            <p:strVal val="4*#ppt_w"/>
+                                          </p:val>
+                                        </p:tav>
+                                        <p:tav tm="100000">
+                                          <p:val>
+                                            <p:strVal val="#ppt_w"/>
+                                          </p:val>
+                                        </p:tav>
+                                      </p:tavLst>
+                                    </p:anim>
+                                    <p:anim calcmode="lin" valueType="num">
+                                      <p:cBhvr>
+                                        <p:cTn id="20" dur="500" fill="hold"/>
+                                        <p:tgtEl>
+                                          <p:spTgt spid="17"/>
+                                        </p:tgtEl>
+                                        <p:attrNameLst>
+                                          <p:attrName>ppt_h</p:attrName>
+                                        </p:attrNameLst>
+                                      </p:cBhvr>
+                                      <p:tavLst>
+                                        <p:tav tm="0">
+                                          <p:val>
+                                            <p:strVal val="4*#ppt_h"/>
+                                          </p:val>
+                                        </p:tav>
+                                        <p:tav tm="100000">
+                                          <p:val>
+                                            <p:strVal val="#ppt_h"/>
+                                          </p:val>
+                                        </p:tav>
+                                      </p:tavLst>
+                                    </p:anim>
+                                  </p:childTnLst>
+                                </p:cTn>
+                              </p:par>
+                            </p:childTnLst>
+                          </p:cTn>
+                        </p:par>
+                      </p:childTnLst>
+                    </p:cTn>
+                  </p:par>
+                  <p:par>
+                    <p:cTn id="21" fill="hold">
+                      <p:stCondLst>
+                        <p:cond delay="indefinite"/>
+                      </p:stCondLst>
+                      <p:childTnLst>
+                        <p:par>
+                          <p:cTn id="22" fill="hold">
+                            <p:stCondLst>
+                              <p:cond delay="0"/>
+                            </p:stCondLst>
+                            <p:childTnLst>
+                              <p:par>
+                                <p:cTn id="23" presetID="23" presetClass="entr" presetSubtype="32" fill="hold" nodeType="clickEffect">
+                                  <p:stCondLst>
+                                    <p:cond delay="0"/>
+                                  </p:stCondLst>
+                                  <p:childTnLst>
+                                    <p:set>
+                                      <p:cBhvr>
+                                        <p:cTn id="24" dur="1" fill="hold">
+                                          <p:stCondLst>
+                                            <p:cond delay="0"/>
+                                          </p:stCondLst>
+                                        </p:cTn>
+                                        <p:tgtEl>
+                                          <p:spTgt spid="19"/>
+                                        </p:tgtEl>
+                                        <p:attrNameLst>
+                                          <p:attrName>style.visibility</p:attrName>
+                                        </p:attrNameLst>
+                                      </p:cBhvr>
+                                      <p:to>
+                                        <p:strVal val="visible"/>
+                                      </p:to>
+                                    </p:set>
+                                    <p:anim calcmode="lin" valueType="num">
+                                      <p:cBhvr>
+                                        <p:cTn id="25" dur="500" fill="hold"/>
+                                        <p:tgtEl>
+                                          <p:spTgt spid="19"/>
+                                        </p:tgtEl>
+                                        <p:attrNameLst>
+                                          <p:attrName>ppt_w</p:attrName>
+                                        </p:attrNameLst>
+                                      </p:cBhvr>
+                                      <p:tavLst>
+                                        <p:tav tm="0">
+                                          <p:val>
+                                            <p:strVal val="4*#ppt_w"/>
+                                          </p:val>
+                                        </p:tav>
+                                        <p:tav tm="100000">
+                                          <p:val>
+                                            <p:strVal val="#ppt_w"/>
+                                          </p:val>
+                                        </p:tav>
+                                      </p:tavLst>
+                                    </p:anim>
+                                    <p:anim calcmode="lin" valueType="num">
+                                      <p:cBhvr>
+                                        <p:cTn id="26" dur="500" fill="hold"/>
+                                        <p:tgtEl>
+                                          <p:spTgt spid="19"/>
+                                        </p:tgtEl>
+                                        <p:attrNameLst>
+                                          <p:attrName>ppt_h</p:attrName>
+                                        </p:attrNameLst>
+                                      </p:cBhvr>
+                                      <p:tavLst>
+                                        <p:tav tm="0">
+                                          <p:val>
+                                            <p:strVal val="4*#ppt_h"/>
+                                          </p:val>
+                                        </p:tav>
+                                        <p:tav tm="100000">
+                                          <p:val>
+                                            <p:strVal val="#ppt_h"/>
+                                          </p:val>
+                                        </p:tav>
+                                      </p:tavLst>
+                                    </p:anim>
+                                  </p:childTnLst>
+                                </p:cTn>
+                              </p:par>
+                            </p:childTnLst>
+                          </p:cTn>
+                        </p:par>
+                      </p:childTnLst>
+                    </p:cTn>
+                  </p:par>
+                </p:childTnLst>
+              </p:cTn>
+              <p:prevCondLst>
+                <p:cond evt="onPrev" delay="0">
+                  <p:tgtEl>
+                    <p:sldTgt/>
+                  </p:tgtEl>
+                </p:cond>
+              </p:prevCondLst>
+              <p:nextCondLst>
+                <p:cond evt="onNext" delay="0">
+                  <p:tgtEl>
+                    <p:sldTgt/>
+                  </p:tgtEl>
+                </p:cond>
+              </p:nextCondLst>
+            </p:seq>
+          </p:childTnLst>
+        </p:cTn>
+      </p:par>
+    </p:tnLst>
+  </p:timing>
+</p:sld>
+</file>
+
+<file path=ppt/slides/slide11.xml><?xml version="1.0" encoding="utf-8"?>
+<p:sld xmlns:a="http://schemas.openxmlformats.org/drawingml/2006/main" xmlns:r="http://schemas.openxmlformats.org/officeDocument/2006/relationships" xmlns:p="http://schemas.openxmlformats.org/presentationml/2006/main">
+  <p:cSld>
+    <p:spTree>
+      <p:nvGrpSpPr>
+        <p:cNvPr id="1" name=""/>
+        <p:cNvGrpSpPr/>
+        <p:nvPr/>
+      </p:nvGrpSpPr>
+      <p:grpSpPr>
+        <a:xfrm>
+          <a:off x="0" y="0"/>
+          <a:ext cx="0" cy="0"/>
+          <a:chOff x="0" y="0"/>
+          <a:chExt cx="0" cy="0"/>
+        </a:xfrm>
+      </p:grpSpPr>
+      <p:sp>
+        <p:nvSpPr>
+          <p:cNvPr id="2" name="Titel 1">
+            <a:extLst>
+              <a:ext uri="{FF2B5EF4-FFF2-40B4-BE49-F238E27FC236}">
+                <a16:creationId xmlns:a16="http://schemas.microsoft.com/office/drawing/2014/main" id="{36237A27-8D02-274E-A6F9-BF5132561BA9}"/>
+              </a:ext>
+            </a:extLst>
+          </p:cNvPr>
+          <p:cNvSpPr>
+            <a:spLocks noGrp="1"/>
+          </p:cNvSpPr>
+          <p:nvPr>
+            <p:ph type="title"/>
+          </p:nvPr>
+        </p:nvSpPr>
+        <p:spPr/>
+        <p:txBody>
+          <a:bodyPr/>
+          <a:lstStyle/>
+          <a:p>
+            <a:pPr algn="ctr"/>
+            <a:r>
+              <a:rPr lang="de-DE" dirty="0"/>
+              <a:t>Twitter </a:t>
+            </a:r>
+            <a:r>
+              <a:rPr lang="de-DE" dirty="0" err="1"/>
+              <a:t>metrics</a:t>
+            </a:r>
+            <a:endParaRPr lang="de-DE" dirty="0"/>
+          </a:p>
+        </p:txBody>
+      </p:sp>
+      <p:sp>
+        <p:nvSpPr>
+          <p:cNvPr id="3" name="Inhaltsplatzhalter 2">
+            <a:extLst>
+              <a:ext uri="{FF2B5EF4-FFF2-40B4-BE49-F238E27FC236}">
+                <a16:creationId xmlns:a16="http://schemas.microsoft.com/office/drawing/2014/main" id="{269FA0E1-5417-F84B-A94C-64972BC6A609}"/>
+              </a:ext>
+            </a:extLst>
+          </p:cNvPr>
+          <p:cNvSpPr>
+            <a:spLocks noGrp="1"/>
+          </p:cNvSpPr>
+          <p:nvPr>
+            <p:ph idx="1"/>
+          </p:nvPr>
+        </p:nvSpPr>
+        <p:spPr/>
+        <p:txBody>
+          <a:bodyPr/>
+          <a:lstStyle/>
+          <a:p>
+            <a:r>
+              <a:rPr lang="de-DE" dirty="0" err="1"/>
+              <a:t>Likes</a:t>
+            </a:r>
+            <a:endParaRPr lang="de-DE" dirty="0"/>
+          </a:p>
+          <a:p>
+            <a:r>
+              <a:rPr lang="de-DE" dirty="0" err="1"/>
+              <a:t>Retweets</a:t>
+            </a:r>
+            <a:endParaRPr lang="de-DE" dirty="0"/>
+          </a:p>
+          <a:p>
+            <a:r>
+              <a:rPr lang="de-DE" dirty="0" err="1"/>
+              <a:t>Replies</a:t>
+            </a:r>
+            <a:endParaRPr lang="de-DE" dirty="0"/>
+          </a:p>
+          <a:p>
+            <a:r>
+              <a:rPr lang="de-DE" dirty="0"/>
+              <a:t>(</a:t>
+            </a:r>
+            <a:r>
+              <a:rPr lang="de-DE" dirty="0" err="1"/>
+              <a:t>Quotes</a:t>
+            </a:r>
+            <a:r>
+              <a:rPr lang="de-DE" dirty="0"/>
+              <a:t>)</a:t>
+            </a:r>
+          </a:p>
+          <a:p>
+            <a:endParaRPr lang="de-DE" dirty="0"/>
+          </a:p>
+        </p:txBody>
+      </p:sp>
+      <p:sp>
+        <p:nvSpPr>
+          <p:cNvPr id="4" name="Textfeld 3">
+            <a:extLst>
+              <a:ext uri="{FF2B5EF4-FFF2-40B4-BE49-F238E27FC236}">
+                <a16:creationId xmlns:a16="http://schemas.microsoft.com/office/drawing/2014/main" id="{32237C78-5C76-0A43-94F5-BF615360AFC8}"/>
+              </a:ext>
+            </a:extLst>
+          </p:cNvPr>
+          <p:cNvSpPr txBox="1"/>
+          <p:nvPr/>
+        </p:nvSpPr>
+        <p:spPr>
+          <a:xfrm>
+            <a:off x="2790092" y="3704492"/>
+            <a:ext cx="184731" cy="369332"/>
+          </a:xfrm>
+          <a:prstGeom prst="rect">
+            <a:avLst/>
+          </a:prstGeom>
+          <a:noFill/>
+        </p:spPr>
+        <p:txBody>
+          <a:bodyPr wrap="none" rtlCol="0">
+            <a:spAutoFit/>
+          </a:bodyPr>
+          <a:lstStyle/>
+          <a:p>
+            <a:endParaRPr lang="de-DE" dirty="0"/>
+          </a:p>
+        </p:txBody>
+      </p:sp>
+    </p:spTree>
+    <p:extLst>
+      <p:ext uri="{BB962C8B-B14F-4D97-AF65-F5344CB8AC3E}">
+        <p14:creationId xmlns:p14="http://schemas.microsoft.com/office/powerpoint/2010/main" val="129148572"/>
+      </p:ext>
+    </p:extLst>
+  </p:cSld>
+  <p:clrMapOvr>
+    <a:masterClrMapping/>
+  </p:clrMapOvr>
+</p:sld>
+</file>
+
+<file path=ppt/slides/slide12.xml><?xml version="1.0" encoding="utf-8"?>
+<p:sld xmlns:a="http://schemas.openxmlformats.org/drawingml/2006/main" xmlns:r="http://schemas.openxmlformats.org/officeDocument/2006/relationships" xmlns:p="http://schemas.openxmlformats.org/presentationml/2006/main">
+  <p:cSld>
+    <p:spTree>
+      <p:nvGrpSpPr>
+        <p:cNvPr id="1" name=""/>
+        <p:cNvGrpSpPr/>
+        <p:nvPr/>
+      </p:nvGrpSpPr>
+      <p:grpSpPr>
+        <a:xfrm>
+          <a:off x="0" y="0"/>
+          <a:ext cx="0" cy="0"/>
+          <a:chOff x="0" y="0"/>
+          <a:chExt cx="0" cy="0"/>
+        </a:xfrm>
+      </p:grpSpPr>
+      <p:sp>
+        <p:nvSpPr>
+          <p:cNvPr id="2" name="Titel 1">
+            <a:extLst>
+              <a:ext uri="{FF2B5EF4-FFF2-40B4-BE49-F238E27FC236}">
+                <a16:creationId xmlns:a16="http://schemas.microsoft.com/office/drawing/2014/main" id="{1782E33F-B94A-6446-A3A1-C393C77CAA00}"/>
+              </a:ext>
+            </a:extLst>
+          </p:cNvPr>
+          <p:cNvSpPr>
+            <a:spLocks noGrp="1"/>
+          </p:cNvSpPr>
+          <p:nvPr>
+            <p:ph type="title"/>
+          </p:nvPr>
+        </p:nvSpPr>
+        <p:spPr/>
+        <p:txBody>
+          <a:bodyPr/>
+          <a:lstStyle/>
+          <a:p>
+            <a:pPr algn="ctr"/>
+            <a:r>
+              <a:rPr lang="de-DE" dirty="0" err="1"/>
+              <a:t>Raw</a:t>
+            </a:r>
+            <a:r>
+              <a:rPr lang="de-DE" dirty="0"/>
+              <a:t> Twitter Data</a:t>
+            </a:r>
+          </a:p>
+        </p:txBody>
+      </p:sp>
+      <p:pic>
+        <p:nvPicPr>
+          <p:cNvPr id="5" name="Inhaltsplatzhalter 4">
+            <a:extLst>
+              <a:ext uri="{FF2B5EF4-FFF2-40B4-BE49-F238E27FC236}">
+                <a16:creationId xmlns:a16="http://schemas.microsoft.com/office/drawing/2014/main" id="{F3D0925C-E25B-E743-BA9C-CB471757891B}"/>
+              </a:ext>
+            </a:extLst>
+          </p:cNvPr>
+          <p:cNvPicPr>
+            <a:picLocks noGrp="1" noChangeAspect="1"/>
+          </p:cNvPicPr>
+          <p:nvPr>
+            <p:ph idx="1"/>
+          </p:nvPr>
+        </p:nvPicPr>
+        <p:blipFill rotWithShape="1">
+          <a:blip r:embed="rId2"/>
+          <a:srcRect r="32163"/>
+          <a:stretch/>
+        </p:blipFill>
+        <p:spPr>
+          <a:xfrm>
+            <a:off x="763177" y="1690688"/>
+            <a:ext cx="10665645" cy="4286706"/>
+          </a:xfrm>
+        </p:spPr>
+      </p:pic>
+    </p:spTree>
+    <p:extLst>
+      <p:ext uri="{BB962C8B-B14F-4D97-AF65-F5344CB8AC3E}">
+        <p14:creationId xmlns:p14="http://schemas.microsoft.com/office/powerpoint/2010/main" val="1134814071"/>
+      </p:ext>
+    </p:extLst>
+  </p:cSld>
+  <p:clrMapOvr>
+    <a:masterClrMapping/>
+  </p:clrMapOvr>
+</p:sld>
+</file>
+
+<file path=ppt/slides/slide13.xml><?xml version="1.0" encoding="utf-8"?>
+<p:sld xmlns:a="http://schemas.openxmlformats.org/drawingml/2006/main" xmlns:r="http://schemas.openxmlformats.org/officeDocument/2006/relationships" xmlns:p="http://schemas.openxmlformats.org/presentationml/2006/main">
+  <p:cSld>
+    <p:spTree>
+      <p:nvGrpSpPr>
+        <p:cNvPr id="1" name=""/>
+        <p:cNvGrpSpPr/>
+        <p:nvPr/>
+      </p:nvGrpSpPr>
+      <p:grpSpPr>
+        <a:xfrm>
+          <a:off x="0" y="0"/>
+          <a:ext cx="0" cy="0"/>
+          <a:chOff x="0" y="0"/>
+          <a:chExt cx="0" cy="0"/>
+        </a:xfrm>
+      </p:grpSpPr>
+      <p:sp>
+        <p:nvSpPr>
+          <p:cNvPr id="2" name="Titel 1">
+            <a:extLst>
+              <a:ext uri="{FF2B5EF4-FFF2-40B4-BE49-F238E27FC236}">
+                <a16:creationId xmlns:a16="http://schemas.microsoft.com/office/drawing/2014/main" id="{112A9E44-7EB2-2745-A5F1-8A423F6518BF}"/>
+              </a:ext>
+            </a:extLst>
+          </p:cNvPr>
+          <p:cNvSpPr>
+            <a:spLocks noGrp="1"/>
+          </p:cNvSpPr>
+          <p:nvPr>
+            <p:ph type="title"/>
+          </p:nvPr>
+        </p:nvSpPr>
+        <p:spPr/>
+        <p:txBody>
+          <a:bodyPr/>
+          <a:lstStyle/>
+          <a:p>
+            <a:pPr algn="ctr"/>
+            <a:r>
+              <a:rPr lang="de-DE" dirty="0" err="1"/>
+              <a:t>Processed</a:t>
+            </a:r>
+            <a:r>
+              <a:rPr lang="de-DE" dirty="0"/>
+              <a:t> Twitter Data</a:t>
+            </a:r>
+          </a:p>
+        </p:txBody>
+      </p:sp>
+      <p:pic>
+        <p:nvPicPr>
+          <p:cNvPr id="5" name="Inhaltsplatzhalter 4" descr="Ein Bild, das Text enthält.&#10;&#10;Automatisch generierte Beschreibung">
+            <a:extLst>
+              <a:ext uri="{FF2B5EF4-FFF2-40B4-BE49-F238E27FC236}">
+                <a16:creationId xmlns:a16="http://schemas.microsoft.com/office/drawing/2014/main" id="{E32557BA-5A05-9943-A948-96F5F2FD9477}"/>
+              </a:ext>
+            </a:extLst>
+          </p:cNvPr>
+          <p:cNvPicPr>
+            <a:picLocks noGrp="1" noChangeAspect="1"/>
+          </p:cNvPicPr>
+          <p:nvPr>
+            <p:ph idx="1"/>
+          </p:nvPr>
+        </p:nvPicPr>
+        <p:blipFill>
+          <a:blip r:embed="rId2"/>
+          <a:stretch>
+            <a:fillRect/>
+          </a:stretch>
+        </p:blipFill>
+        <p:spPr>
+          <a:xfrm>
+            <a:off x="977637" y="2236070"/>
+            <a:ext cx="10376163" cy="2870768"/>
+          </a:xfrm>
+        </p:spPr>
+      </p:pic>
+    </p:spTree>
+    <p:extLst>
+      <p:ext uri="{BB962C8B-B14F-4D97-AF65-F5344CB8AC3E}">
+        <p14:creationId xmlns:p14="http://schemas.microsoft.com/office/powerpoint/2010/main" val="207709236"/>
+      </p:ext>
+    </p:extLst>
+  </p:cSld>
+  <p:clrMapOvr>
+    <a:masterClrMapping/>
+  </p:clrMapOvr>
+</p:sld>
+</file>
+
+<file path=ppt/slides/slide14.xml><?xml version="1.0" encoding="utf-8"?>
+<p:sld xmlns:a="http://schemas.openxmlformats.org/drawingml/2006/main" xmlns:r="http://schemas.openxmlformats.org/officeDocument/2006/relationships" xmlns:p="http://schemas.openxmlformats.org/presentationml/2006/main">
+  <p:cSld>
+    <p:spTree>
+      <p:nvGrpSpPr>
+        <p:cNvPr id="1" name=""/>
+        <p:cNvGrpSpPr/>
+        <p:nvPr/>
+      </p:nvGrpSpPr>
+      <p:grpSpPr>
+        <a:xfrm>
+          <a:off x="0" y="0"/>
+          <a:ext cx="0" cy="0"/>
+          <a:chOff x="0" y="0"/>
+          <a:chExt cx="0" cy="0"/>
+        </a:xfrm>
+      </p:grpSpPr>
+      <p:sp>
+        <p:nvSpPr>
+          <p:cNvPr id="2" name="Titel 1">
+            <a:extLst>
+              <a:ext uri="{FF2B5EF4-FFF2-40B4-BE49-F238E27FC236}">
+                <a16:creationId xmlns:a16="http://schemas.microsoft.com/office/drawing/2014/main" id="{90012E60-5128-2942-A693-8F49D7AA69BE}"/>
+              </a:ext>
+            </a:extLst>
+          </p:cNvPr>
+          <p:cNvSpPr>
+            <a:spLocks noGrp="1"/>
+          </p:cNvSpPr>
+          <p:nvPr>
+            <p:ph type="title"/>
+          </p:nvPr>
+        </p:nvSpPr>
+        <p:spPr/>
+        <p:txBody>
+          <a:bodyPr/>
+          <a:lstStyle/>
+          <a:p>
+            <a:pPr algn="ctr"/>
+            <a:r>
+              <a:rPr lang="de-DE" dirty="0" err="1"/>
+              <a:t>Likes</a:t>
+            </a:r>
+            <a:r>
+              <a:rPr lang="de-DE" dirty="0"/>
+              <a:t> </a:t>
+            </a:r>
+            <a:r>
+              <a:rPr lang="de-DE" dirty="0" err="1"/>
+              <a:t>vs</a:t>
+            </a:r>
+            <a:r>
+              <a:rPr lang="de-DE" dirty="0"/>
+              <a:t> </a:t>
+            </a:r>
+            <a:r>
+              <a:rPr lang="de-DE" dirty="0" err="1"/>
+              <a:t>Retweets</a:t>
+            </a:r>
+            <a:endParaRPr lang="de-DE" dirty="0"/>
+          </a:p>
+        </p:txBody>
+      </p:sp>
+      <p:pic>
+        <p:nvPicPr>
+          <p:cNvPr id="5" name="Inhaltsplatzhalter 4">
+            <a:extLst>
+              <a:ext uri="{FF2B5EF4-FFF2-40B4-BE49-F238E27FC236}">
+                <a16:creationId xmlns:a16="http://schemas.microsoft.com/office/drawing/2014/main" id="{389D0DB7-78BD-224A-96C9-BE077F4C4905}"/>
+              </a:ext>
+            </a:extLst>
+          </p:cNvPr>
+          <p:cNvPicPr>
+            <a:picLocks noGrp="1"/>
+          </p:cNvPicPr>
+          <p:nvPr>
+            <p:ph idx="1"/>
+          </p:nvPr>
+        </p:nvPicPr>
+        <p:blipFill>
+          <a:blip r:embed="rId2"/>
+          <a:stretch>
+            <a:fillRect/>
+          </a:stretch>
+        </p:blipFill>
+        <p:spPr>
+          <a:xfrm>
+            <a:off x="2625306" y="1690688"/>
+            <a:ext cx="6120000" cy="4680000"/>
+          </a:xfrm>
+        </p:spPr>
+      </p:pic>
+    </p:spTree>
+    <p:extLst>
+      <p:ext uri="{BB962C8B-B14F-4D97-AF65-F5344CB8AC3E}">
+        <p14:creationId xmlns:p14="http://schemas.microsoft.com/office/powerpoint/2010/main" val="1479000356"/>
+      </p:ext>
+    </p:extLst>
+  </p:cSld>
+  <p:clrMapOvr>
+    <a:masterClrMapping/>
+  </p:clrMapOvr>
+</p:sld>
+</file>
+
+<file path=ppt/slides/slide15.xml><?xml version="1.0" encoding="utf-8"?>
+<p:sld xmlns:a="http://schemas.openxmlformats.org/drawingml/2006/main" xmlns:r="http://schemas.openxmlformats.org/officeDocument/2006/relationships" xmlns:p="http://schemas.openxmlformats.org/presentationml/2006/main">
+  <p:cSld>
+    <p:spTree>
+      <p:nvGrpSpPr>
+        <p:cNvPr id="1" name=""/>
+        <p:cNvGrpSpPr/>
+        <p:nvPr/>
+      </p:nvGrpSpPr>
+      <p:grpSpPr>
+        <a:xfrm>
+          <a:off x="0" y="0"/>
+          <a:ext cx="0" cy="0"/>
+          <a:chOff x="0" y="0"/>
+          <a:chExt cx="0" cy="0"/>
+        </a:xfrm>
+      </p:grpSpPr>
+      <p:sp>
+        <p:nvSpPr>
+          <p:cNvPr id="2" name="Titel 1">
+            <a:extLst>
+              <a:ext uri="{FF2B5EF4-FFF2-40B4-BE49-F238E27FC236}">
+                <a16:creationId xmlns:a16="http://schemas.microsoft.com/office/drawing/2014/main" id="{EB801685-7E43-B94E-8A7D-E147070A6B1F}"/>
+              </a:ext>
+            </a:extLst>
+          </p:cNvPr>
+          <p:cNvSpPr>
+            <a:spLocks noGrp="1"/>
+          </p:cNvSpPr>
+          <p:nvPr>
+            <p:ph type="title"/>
+          </p:nvPr>
+        </p:nvSpPr>
+        <p:spPr/>
+        <p:txBody>
+          <a:bodyPr/>
+          <a:lstStyle/>
+          <a:p>
+            <a:pPr algn="ctr"/>
+            <a:r>
+              <a:rPr lang="de-DE" dirty="0"/>
+              <a:t>Time Series Exploration</a:t>
+            </a:r>
+          </a:p>
+        </p:txBody>
+      </p:sp>
+      <p:pic>
+        <p:nvPicPr>
+          <p:cNvPr id="5" name="Inhaltsplatzhalter 4">
+            <a:extLst>
+              <a:ext uri="{FF2B5EF4-FFF2-40B4-BE49-F238E27FC236}">
+                <a16:creationId xmlns:a16="http://schemas.microsoft.com/office/drawing/2014/main" id="{768CB916-A479-5B4E-B539-5BF84B928757}"/>
+              </a:ext>
+            </a:extLst>
+          </p:cNvPr>
+          <p:cNvPicPr>
+            <a:picLocks noGrp="1" noChangeAspect="1"/>
+          </p:cNvPicPr>
+          <p:nvPr>
+            <p:ph idx="1"/>
+          </p:nvPr>
+        </p:nvPicPr>
+        <p:blipFill>
+          <a:blip r:embed="rId2"/>
+          <a:stretch>
+            <a:fillRect/>
+          </a:stretch>
+        </p:blipFill>
+        <p:spPr>
+          <a:xfrm>
+            <a:off x="491265" y="2398144"/>
+            <a:ext cx="11209469" cy="3051893"/>
+          </a:xfrm>
+        </p:spPr>
+      </p:pic>
+    </p:spTree>
+    <p:extLst>
+      <p:ext uri="{BB962C8B-B14F-4D97-AF65-F5344CB8AC3E}">
+        <p14:creationId xmlns:p14="http://schemas.microsoft.com/office/powerpoint/2010/main" val="1508557090"/>
+      </p:ext>
+    </p:extLst>
+  </p:cSld>
+  <p:clrMapOvr>
+    <a:masterClrMapping/>
+  </p:clrMapOvr>
+</p:sld>
+</file>
+
+<file path=ppt/slides/slide16.xml><?xml version="1.0" encoding="utf-8"?>
+<p:sld xmlns:a="http://schemas.openxmlformats.org/drawingml/2006/main" xmlns:r="http://schemas.openxmlformats.org/officeDocument/2006/relationships" xmlns:p="http://schemas.openxmlformats.org/presentationml/2006/main">
+  <p:cSld>
+    <p:spTree>
+      <p:nvGrpSpPr>
+        <p:cNvPr id="1" name=""/>
+        <p:cNvGrpSpPr/>
+        <p:nvPr/>
+      </p:nvGrpSpPr>
+      <p:grpSpPr>
+        <a:xfrm>
+          <a:off x="0" y="0"/>
+          <a:ext cx="0" cy="0"/>
+          <a:chOff x="0" y="0"/>
+          <a:chExt cx="0" cy="0"/>
+        </a:xfrm>
+      </p:grpSpPr>
+      <p:sp>
+        <p:nvSpPr>
+          <p:cNvPr id="2" name="Titel 1">
+            <a:extLst>
+              <a:ext uri="{FF2B5EF4-FFF2-40B4-BE49-F238E27FC236}">
+                <a16:creationId xmlns:a16="http://schemas.microsoft.com/office/drawing/2014/main" id="{932045BB-5449-F948-B94D-C30115A8B9F6}"/>
+              </a:ext>
+            </a:extLst>
+          </p:cNvPr>
+          <p:cNvSpPr>
+            <a:spLocks noGrp="1"/>
+          </p:cNvSpPr>
+          <p:nvPr>
+            <p:ph type="title"/>
+          </p:nvPr>
+        </p:nvSpPr>
+        <p:spPr/>
+        <p:txBody>
+          <a:bodyPr/>
+          <a:lstStyle/>
+          <a:p>
+            <a:pPr algn="ctr"/>
+            <a:r>
+              <a:rPr lang="de-DE" dirty="0"/>
+              <a:t>Time Series Exploration</a:t>
+            </a:r>
+          </a:p>
+        </p:txBody>
+      </p:sp>
+      <p:pic>
+        <p:nvPicPr>
+          <p:cNvPr id="5" name="Inhaltsplatzhalter 4">
+            <a:extLst>
+              <a:ext uri="{FF2B5EF4-FFF2-40B4-BE49-F238E27FC236}">
+                <a16:creationId xmlns:a16="http://schemas.microsoft.com/office/drawing/2014/main" id="{7331F14D-03C0-6A46-982F-AF2721EBE166}"/>
+              </a:ext>
+            </a:extLst>
+          </p:cNvPr>
+          <p:cNvPicPr>
+            <a:picLocks noGrp="1"/>
+          </p:cNvPicPr>
+          <p:nvPr>
+            <p:ph idx="1"/>
+          </p:nvPr>
+        </p:nvPicPr>
+        <p:blipFill>
+          <a:blip r:embed="rId2"/>
+          <a:stretch>
+            <a:fillRect/>
+          </a:stretch>
+        </p:blipFill>
+        <p:spPr>
+          <a:xfrm>
+            <a:off x="2698750" y="1690688"/>
+            <a:ext cx="6120000" cy="4680000"/>
+          </a:xfrm>
+        </p:spPr>
+      </p:pic>
+    </p:spTree>
+    <p:extLst>
+      <p:ext uri="{BB962C8B-B14F-4D97-AF65-F5344CB8AC3E}">
+        <p14:creationId xmlns:p14="http://schemas.microsoft.com/office/powerpoint/2010/main" val="1512892570"/>
+      </p:ext>
+    </p:extLst>
+  </p:cSld>
+  <p:clrMapOvr>
+    <a:masterClrMapping/>
+  </p:clrMapOvr>
+</p:sld>
+</file>
+
+<file path=ppt/slides/slide17.xml><?xml version="1.0" encoding="utf-8"?>
+<p:sld xmlns:a="http://schemas.openxmlformats.org/drawingml/2006/main" xmlns:r="http://schemas.openxmlformats.org/officeDocument/2006/relationships" xmlns:p="http://schemas.openxmlformats.org/presentationml/2006/main">
+  <p:cSld>
+    <p:spTree>
+      <p:nvGrpSpPr>
+        <p:cNvPr id="1" name=""/>
+        <p:cNvGrpSpPr/>
+        <p:nvPr/>
+      </p:nvGrpSpPr>
+      <p:grpSpPr>
+        <a:xfrm>
+          <a:off x="0" y="0"/>
+          <a:ext cx="0" cy="0"/>
+          <a:chOff x="0" y="0"/>
+          <a:chExt cx="0" cy="0"/>
+        </a:xfrm>
+      </p:grpSpPr>
+      <p:sp>
+        <p:nvSpPr>
+          <p:cNvPr id="2" name="Titel 1">
+            <a:extLst>
+              <a:ext uri="{FF2B5EF4-FFF2-40B4-BE49-F238E27FC236}">
+                <a16:creationId xmlns:a16="http://schemas.microsoft.com/office/drawing/2014/main" id="{3157C81F-773C-9746-A3D6-2625DFA593DC}"/>
+              </a:ext>
+            </a:extLst>
+          </p:cNvPr>
+          <p:cNvSpPr>
+            <a:spLocks noGrp="1"/>
+          </p:cNvSpPr>
+          <p:nvPr>
+            <p:ph type="title"/>
+          </p:nvPr>
+        </p:nvSpPr>
+        <p:spPr/>
+        <p:txBody>
+          <a:bodyPr/>
+          <a:lstStyle/>
+          <a:p>
+            <a:pPr algn="ctr"/>
+            <a:r>
+              <a:rPr lang="de-DE" dirty="0"/>
+              <a:t>Time Series Exploration</a:t>
+            </a:r>
+          </a:p>
+        </p:txBody>
+      </p:sp>
+      <p:pic>
+        <p:nvPicPr>
+          <p:cNvPr id="5" name="Inhaltsplatzhalter 4">
+            <a:extLst>
+              <a:ext uri="{FF2B5EF4-FFF2-40B4-BE49-F238E27FC236}">
+                <a16:creationId xmlns:a16="http://schemas.microsoft.com/office/drawing/2014/main" id="{215AD514-7C68-F348-BA6C-459E019A79FA}"/>
+              </a:ext>
+            </a:extLst>
+          </p:cNvPr>
+          <p:cNvPicPr>
+            <a:picLocks noGrp="1"/>
+          </p:cNvPicPr>
+          <p:nvPr>
+            <p:ph idx="1"/>
+          </p:nvPr>
+        </p:nvPicPr>
+        <p:blipFill>
+          <a:blip r:embed="rId2"/>
+          <a:stretch>
+            <a:fillRect/>
+          </a:stretch>
+        </p:blipFill>
+        <p:spPr>
+          <a:xfrm>
+            <a:off x="2681497" y="1690688"/>
+            <a:ext cx="6120000" cy="4680000"/>
+          </a:xfrm>
+        </p:spPr>
+      </p:pic>
+    </p:spTree>
+    <p:extLst>
+      <p:ext uri="{BB962C8B-B14F-4D97-AF65-F5344CB8AC3E}">
+        <p14:creationId xmlns:p14="http://schemas.microsoft.com/office/powerpoint/2010/main" val="3075694399"/>
+      </p:ext>
+    </p:extLst>
+  </p:cSld>
+  <p:clrMapOvr>
+    <a:masterClrMapping/>
+  </p:clrMapOvr>
+</p:sld>
+</file>
+
+<file path=ppt/slides/slide18.xml><?xml version="1.0" encoding="utf-8"?>
+<p:sld xmlns:a="http://schemas.openxmlformats.org/drawingml/2006/main" xmlns:r="http://schemas.openxmlformats.org/officeDocument/2006/relationships" xmlns:p="http://schemas.openxmlformats.org/presentationml/2006/main">
+  <p:cSld>
+    <p:spTree>
+      <p:nvGrpSpPr>
+        <p:cNvPr id="1" name=""/>
+        <p:cNvGrpSpPr/>
+        <p:nvPr/>
+      </p:nvGrpSpPr>
+      <p:grpSpPr>
+        <a:xfrm>
+          <a:off x="0" y="0"/>
+          <a:ext cx="0" cy="0"/>
+          <a:chOff x="0" y="0"/>
+          <a:chExt cx="0" cy="0"/>
+        </a:xfrm>
+      </p:grpSpPr>
+      <p:sp>
+        <p:nvSpPr>
+          <p:cNvPr id="2" name="Titel 1">
+            <a:extLst>
+              <a:ext uri="{FF2B5EF4-FFF2-40B4-BE49-F238E27FC236}">
+                <a16:creationId xmlns:a16="http://schemas.microsoft.com/office/drawing/2014/main" id="{5707E75C-E65B-D448-973D-EEB4F06BE716}"/>
+              </a:ext>
+            </a:extLst>
+          </p:cNvPr>
+          <p:cNvSpPr>
+            <a:spLocks noGrp="1"/>
+          </p:cNvSpPr>
+          <p:nvPr>
+            <p:ph type="title"/>
+          </p:nvPr>
+        </p:nvSpPr>
+        <p:spPr/>
+        <p:txBody>
+          <a:bodyPr/>
+          <a:lstStyle/>
+          <a:p>
+            <a:pPr algn="ctr"/>
+            <a:r>
+              <a:rPr lang="de-DE" dirty="0"/>
+              <a:t>Time Series Exploration</a:t>
+            </a:r>
+          </a:p>
+        </p:txBody>
+      </p:sp>
+      <p:pic>
+        <p:nvPicPr>
+          <p:cNvPr id="5" name="Inhaltsplatzhalter 4">
+            <a:extLst>
+              <a:ext uri="{FF2B5EF4-FFF2-40B4-BE49-F238E27FC236}">
+                <a16:creationId xmlns:a16="http://schemas.microsoft.com/office/drawing/2014/main" id="{713F6664-5542-B947-8634-4F45BD21CAA8}"/>
+              </a:ext>
+            </a:extLst>
+          </p:cNvPr>
+          <p:cNvPicPr>
+            <a:picLocks noGrp="1" noChangeAspect="1"/>
+          </p:cNvPicPr>
+          <p:nvPr>
+            <p:ph idx="1"/>
+          </p:nvPr>
+        </p:nvPicPr>
+        <p:blipFill>
+          <a:blip r:embed="rId2"/>
+          <a:stretch>
+            <a:fillRect/>
+          </a:stretch>
+        </p:blipFill>
+        <p:spPr>
+          <a:xfrm>
+            <a:off x="329745" y="2359430"/>
+            <a:ext cx="11282847" cy="3071871"/>
+          </a:xfrm>
+        </p:spPr>
+      </p:pic>
+    </p:spTree>
+    <p:extLst>
+      <p:ext uri="{BB962C8B-B14F-4D97-AF65-F5344CB8AC3E}">
+        <p14:creationId xmlns:p14="http://schemas.microsoft.com/office/powerpoint/2010/main" val="1728770178"/>
+      </p:ext>
+    </p:extLst>
+  </p:cSld>
+  <p:clrMapOvr>
+    <a:masterClrMapping/>
+  </p:clrMapOvr>
+</p:sld>
+</file>
+
+<file path=ppt/slides/slide19.xml><?xml version="1.0" encoding="utf-8"?>
+<p:sld xmlns:a="http://schemas.openxmlformats.org/drawingml/2006/main" xmlns:r="http://schemas.openxmlformats.org/officeDocument/2006/relationships" xmlns:p="http://schemas.openxmlformats.org/presentationml/2006/main">
+  <p:cSld>
+    <p:spTree>
+      <p:nvGrpSpPr>
+        <p:cNvPr id="1" name=""/>
+        <p:cNvGrpSpPr/>
+        <p:nvPr/>
+      </p:nvGrpSpPr>
+      <p:grpSpPr>
+        <a:xfrm>
+          <a:off x="0" y="0"/>
+          <a:ext cx="0" cy="0"/>
+          <a:chOff x="0" y="0"/>
+          <a:chExt cx="0" cy="0"/>
+        </a:xfrm>
+      </p:grpSpPr>
+      <p:sp>
+        <p:nvSpPr>
+          <p:cNvPr id="2" name="Titel 1">
+            <a:extLst>
+              <a:ext uri="{FF2B5EF4-FFF2-40B4-BE49-F238E27FC236}">
+                <a16:creationId xmlns:a16="http://schemas.microsoft.com/office/drawing/2014/main" id="{E1593FDA-D260-AD4E-9777-837F77E74B7C}"/>
+              </a:ext>
+            </a:extLst>
+          </p:cNvPr>
+          <p:cNvSpPr>
+            <a:spLocks noGrp="1"/>
+          </p:cNvSpPr>
+          <p:nvPr>
+            <p:ph type="title"/>
+          </p:nvPr>
+        </p:nvSpPr>
+        <p:spPr/>
+        <p:txBody>
+          <a:bodyPr/>
+          <a:lstStyle/>
+          <a:p>
+            <a:pPr algn="ctr"/>
+            <a:r>
+              <a:rPr lang="de-DE" dirty="0"/>
+              <a:t>GARCH(1,1)-</a:t>
+            </a:r>
+            <a:r>
+              <a:rPr lang="de-DE" dirty="0" err="1"/>
+              <a:t>t</a:t>
+            </a:r>
+            <a:r>
+              <a:rPr lang="de-DE" baseline="-25000" dirty="0" err="1"/>
+              <a:t>nu</a:t>
+            </a:r>
+            <a:endParaRPr lang="de-DE" dirty="0"/>
+          </a:p>
+        </p:txBody>
+      </p:sp>
+      <p:pic>
+        <p:nvPicPr>
+          <p:cNvPr id="7" name="Inhaltsplatzhalter 6" descr="Ein Bild, das Tisch enthält.&#10;&#10;Automatisch generierte Beschreibung">
+            <a:extLst>
+              <a:ext uri="{FF2B5EF4-FFF2-40B4-BE49-F238E27FC236}">
+                <a16:creationId xmlns:a16="http://schemas.microsoft.com/office/drawing/2014/main" id="{6E61690D-02D8-E140-9FCE-976AD6D61D2E}"/>
+              </a:ext>
+            </a:extLst>
+          </p:cNvPr>
+          <p:cNvPicPr>
+            <a:picLocks noGrp="1" noChangeAspect="1"/>
+          </p:cNvPicPr>
+          <p:nvPr>
+            <p:ph idx="1"/>
+          </p:nvPr>
+        </p:nvPicPr>
+        <p:blipFill>
+          <a:blip r:embed="rId2"/>
+          <a:stretch>
+            <a:fillRect/>
+          </a:stretch>
+        </p:blipFill>
+        <p:spPr>
+          <a:xfrm>
+            <a:off x="1104433" y="2394273"/>
+            <a:ext cx="10249367" cy="3198168"/>
+          </a:xfrm>
+        </p:spPr>
+      </p:pic>
+    </p:spTree>
+    <p:extLst>
+      <p:ext uri="{BB962C8B-B14F-4D97-AF65-F5344CB8AC3E}">
+        <p14:creationId xmlns:p14="http://schemas.microsoft.com/office/powerpoint/2010/main" val="3357631715"/>
+      </p:ext>
+    </p:extLst>
+  </p:cSld>
+  <p:clrMapOvr>
+    <a:masterClrMapping/>
+  </p:clrMapOvr>
+</p:sld>
+</file>
+
+<file path=ppt/slides/slide2.xml><?xml version="1.0" encoding="utf-8"?>
+<p:sld xmlns:a="http://schemas.openxmlformats.org/drawingml/2006/main" xmlns:r="http://schemas.openxmlformats.org/officeDocument/2006/relationships" xmlns:p="http://schemas.openxmlformats.org/presentationml/2006/main">
+  <p:cSld>
+    <p:spTree>
+      <p:nvGrpSpPr>
+        <p:cNvPr id="1" name=""/>
+        <p:cNvGrpSpPr/>
+        <p:nvPr/>
+      </p:nvGrpSpPr>
+      <p:grpSpPr>
+        <a:xfrm>
+          <a:off x="0" y="0"/>
+          <a:ext cx="0" cy="0"/>
+          <a:chOff x="0" y="0"/>
+          <a:chExt cx="0" cy="0"/>
+        </a:xfrm>
+      </p:grpSpPr>
+      <p:sp>
+        <p:nvSpPr>
+          <p:cNvPr id="2" name="Titel 1">
+            <a:extLst>
+              <a:ext uri="{FF2B5EF4-FFF2-40B4-BE49-F238E27FC236}">
+                <a16:creationId xmlns:a16="http://schemas.microsoft.com/office/drawing/2014/main" id="{2A7DD491-0D31-A34F-A768-C972F552F510}"/>
+              </a:ext>
+            </a:extLst>
+          </p:cNvPr>
+          <p:cNvSpPr>
+            <a:spLocks noGrp="1"/>
+          </p:cNvSpPr>
+          <p:nvPr>
+            <p:ph type="title"/>
+          </p:nvPr>
+        </p:nvSpPr>
+        <p:spPr/>
+        <p:txBody>
+          <a:bodyPr/>
+          <a:lstStyle/>
+          <a:p>
+            <a:pPr algn="ctr"/>
+            <a:r>
+              <a:rPr lang="de-DE" dirty="0"/>
+              <a:t>Plan</a:t>
+            </a:r>
+          </a:p>
+        </p:txBody>
+      </p:sp>
+      <p:sp>
+        <p:nvSpPr>
+          <p:cNvPr id="3" name="Inhaltsplatzhalter 2">
+            <a:extLst>
+              <a:ext uri="{FF2B5EF4-FFF2-40B4-BE49-F238E27FC236}">
+                <a16:creationId xmlns:a16="http://schemas.microsoft.com/office/drawing/2014/main" id="{D75A0760-DBA3-7A4A-BC55-466CCACC493C}"/>
+              </a:ext>
+            </a:extLst>
+          </p:cNvPr>
+          <p:cNvSpPr>
+            <a:spLocks noGrp="1"/>
+          </p:cNvSpPr>
+          <p:nvPr>
+            <p:ph idx="1"/>
+          </p:nvPr>
+        </p:nvSpPr>
+        <p:spPr/>
+        <p:txBody>
+          <a:bodyPr/>
+          <a:lstStyle/>
+          <a:p>
+            <a:r>
+              <a:rPr lang="de-DE" dirty="0" err="1"/>
+              <a:t>Introduction</a:t>
+            </a:r>
+            <a:r>
+              <a:rPr lang="de-DE" dirty="0"/>
+              <a:t> </a:t>
+            </a:r>
+            <a:r>
+              <a:rPr lang="de-DE" dirty="0" err="1"/>
+              <a:t>and</a:t>
+            </a:r>
+            <a:r>
+              <a:rPr lang="de-DE" dirty="0"/>
+              <a:t> </a:t>
+            </a:r>
+            <a:r>
+              <a:rPr lang="de-DE" dirty="0" err="1"/>
+              <a:t>expectations</a:t>
+            </a:r>
+            <a:endParaRPr lang="de-DE" dirty="0"/>
+          </a:p>
+          <a:p>
+            <a:r>
+              <a:rPr lang="de-DE" dirty="0"/>
+              <a:t>Tesla stock</a:t>
+            </a:r>
+          </a:p>
+          <a:p>
+            <a:r>
+              <a:rPr lang="de-DE" dirty="0"/>
+              <a:t>Variables </a:t>
+            </a:r>
+            <a:r>
+              <a:rPr lang="de-DE" dirty="0" err="1"/>
+              <a:t>and</a:t>
+            </a:r>
+            <a:r>
+              <a:rPr lang="de-DE" dirty="0"/>
+              <a:t> </a:t>
+            </a:r>
+            <a:r>
+              <a:rPr lang="de-DE" dirty="0" err="1"/>
+              <a:t>preprocessing</a:t>
+            </a:r>
+            <a:endParaRPr lang="de-DE" dirty="0"/>
+          </a:p>
+          <a:p>
+            <a:r>
+              <a:rPr lang="de-DE" dirty="0"/>
+              <a:t>Time Series </a:t>
+            </a:r>
+            <a:r>
+              <a:rPr lang="de-DE" dirty="0" err="1"/>
+              <a:t>approach</a:t>
+            </a:r>
+            <a:endParaRPr lang="de-DE" dirty="0"/>
+          </a:p>
+          <a:p>
+            <a:r>
+              <a:rPr lang="de-DE" dirty="0" err="1"/>
+              <a:t>Machine</a:t>
+            </a:r>
+            <a:r>
+              <a:rPr lang="de-DE" dirty="0"/>
+              <a:t> Learning </a:t>
+            </a:r>
+            <a:r>
+              <a:rPr lang="de-DE" dirty="0" err="1"/>
+              <a:t>approach</a:t>
+            </a:r>
+            <a:endParaRPr lang="de-DE" dirty="0"/>
+          </a:p>
+          <a:p>
+            <a:r>
+              <a:rPr lang="de-DE" dirty="0" err="1"/>
+              <a:t>Conclusion</a:t>
+            </a:r>
+            <a:endParaRPr lang="de-DE" dirty="0"/>
+          </a:p>
+        </p:txBody>
+      </p:sp>
+    </p:spTree>
+    <p:extLst>
+      <p:ext uri="{BB962C8B-B14F-4D97-AF65-F5344CB8AC3E}">
+        <p14:creationId xmlns:p14="http://schemas.microsoft.com/office/powerpoint/2010/main" val="6897828"/>
+      </p:ext>
+    </p:extLst>
+  </p:cSld>
+  <p:clrMapOvr>
+    <a:masterClrMapping/>
+  </p:clrMapOvr>
+</p:sld>
+</file>
+
+<file path=ppt/slides/slide20.xml><?xml version="1.0" encoding="utf-8"?>
+<p:sld xmlns:a="http://schemas.openxmlformats.org/drawingml/2006/main" xmlns:r="http://schemas.openxmlformats.org/officeDocument/2006/relationships" xmlns:p="http://schemas.openxmlformats.org/presentationml/2006/main">
+  <p:cSld>
+    <p:spTree>
+      <p:nvGrpSpPr>
+        <p:cNvPr id="1" name=""/>
+        <p:cNvGrpSpPr/>
+        <p:nvPr/>
+      </p:nvGrpSpPr>
+      <p:grpSpPr>
+        <a:xfrm>
+          <a:off x="0" y="0"/>
+          <a:ext cx="0" cy="0"/>
+          <a:chOff x="0" y="0"/>
+          <a:chExt cx="0" cy="0"/>
+        </a:xfrm>
+      </p:grpSpPr>
+      <p:sp>
+        <p:nvSpPr>
+          <p:cNvPr id="2" name="Titel 1">
+            <a:extLst>
+              <a:ext uri="{FF2B5EF4-FFF2-40B4-BE49-F238E27FC236}">
+                <a16:creationId xmlns:a16="http://schemas.microsoft.com/office/drawing/2014/main" id="{FB94FD29-2324-334E-9929-7C08A51C52CC}"/>
+              </a:ext>
+            </a:extLst>
+          </p:cNvPr>
+          <p:cNvSpPr>
+            <a:spLocks noGrp="1"/>
+          </p:cNvSpPr>
+          <p:nvPr>
+            <p:ph type="title"/>
+          </p:nvPr>
+        </p:nvSpPr>
+        <p:spPr/>
+        <p:txBody>
+          <a:bodyPr/>
+          <a:lstStyle/>
+          <a:p>
+            <a:pPr algn="ctr"/>
+            <a:r>
+              <a:rPr lang="de-DE" dirty="0" err="1"/>
+              <a:t>Residuals</a:t>
+            </a:r>
+            <a:r>
+              <a:rPr lang="de-DE" dirty="0"/>
+              <a:t> </a:t>
+            </a:r>
+            <a:r>
+              <a:rPr lang="de-DE" dirty="0" err="1"/>
+              <a:t>and</a:t>
+            </a:r>
+            <a:r>
+              <a:rPr lang="de-DE" dirty="0"/>
+              <a:t> </a:t>
+            </a:r>
+            <a:r>
+              <a:rPr lang="de-DE" dirty="0" err="1"/>
+              <a:t>Volatility</a:t>
+            </a:r>
+            <a:endParaRPr lang="de-DE" dirty="0"/>
+          </a:p>
+        </p:txBody>
+      </p:sp>
+      <p:pic>
+        <p:nvPicPr>
+          <p:cNvPr id="5" name="Inhaltsplatzhalter 4">
+            <a:extLst>
+              <a:ext uri="{FF2B5EF4-FFF2-40B4-BE49-F238E27FC236}">
+                <a16:creationId xmlns:a16="http://schemas.microsoft.com/office/drawing/2014/main" id="{0AAE4403-96A3-3041-B148-817F7C525413}"/>
+              </a:ext>
+            </a:extLst>
+          </p:cNvPr>
+          <p:cNvPicPr>
+            <a:picLocks noGrp="1" noChangeAspect="1"/>
+          </p:cNvPicPr>
+          <p:nvPr>
+            <p:ph idx="1"/>
+          </p:nvPr>
+        </p:nvPicPr>
+        <p:blipFill>
+          <a:blip r:embed="rId2"/>
+          <a:stretch>
+            <a:fillRect/>
+          </a:stretch>
+        </p:blipFill>
+        <p:spPr>
+          <a:xfrm>
+            <a:off x="2915728" y="1690688"/>
+            <a:ext cx="6038490" cy="4401742"/>
+          </a:xfrm>
+        </p:spPr>
+      </p:pic>
+    </p:spTree>
+    <p:extLst>
+      <p:ext uri="{BB962C8B-B14F-4D97-AF65-F5344CB8AC3E}">
+        <p14:creationId xmlns:p14="http://schemas.microsoft.com/office/powerpoint/2010/main" val="172862122"/>
+      </p:ext>
+    </p:extLst>
+  </p:cSld>
+  <p:clrMapOvr>
+    <a:masterClrMapping/>
+  </p:clrMapOvr>
+</p:sld>
+</file>
+
+<file path=ppt/slides/slide21.xml><?xml version="1.0" encoding="utf-8"?>
+<p:sld xmlns:a="http://schemas.openxmlformats.org/drawingml/2006/main" xmlns:r="http://schemas.openxmlformats.org/officeDocument/2006/relationships" xmlns:p="http://schemas.openxmlformats.org/presentationml/2006/main">
+  <p:cSld>
+    <p:spTree>
+      <p:nvGrpSpPr>
+        <p:cNvPr id="1" name=""/>
+        <p:cNvGrpSpPr/>
+        <p:nvPr/>
+      </p:nvGrpSpPr>
+      <p:grpSpPr>
+        <a:xfrm>
+          <a:off x="0" y="0"/>
+          <a:ext cx="0" cy="0"/>
+          <a:chOff x="0" y="0"/>
+          <a:chExt cx="0" cy="0"/>
+        </a:xfrm>
+      </p:grpSpPr>
+      <p:sp>
+        <p:nvSpPr>
+          <p:cNvPr id="2" name="Titel 1">
+            <a:extLst>
+              <a:ext uri="{FF2B5EF4-FFF2-40B4-BE49-F238E27FC236}">
+                <a16:creationId xmlns:a16="http://schemas.microsoft.com/office/drawing/2014/main" id="{BD23A22B-2769-A448-838C-45AE493CFB35}"/>
+              </a:ext>
+            </a:extLst>
+          </p:cNvPr>
+          <p:cNvSpPr>
+            <a:spLocks noGrp="1"/>
+          </p:cNvSpPr>
+          <p:nvPr>
+            <p:ph type="title"/>
+          </p:nvPr>
+        </p:nvSpPr>
+        <p:spPr/>
+        <p:txBody>
+          <a:bodyPr/>
+          <a:lstStyle/>
+          <a:p>
+            <a:pPr algn="ctr"/>
+            <a:r>
+              <a:rPr lang="de-DE" dirty="0"/>
+              <a:t>Fit </a:t>
+            </a:r>
+            <a:r>
+              <a:rPr lang="de-DE" dirty="0" err="1"/>
+              <a:t>Diagnostic</a:t>
+            </a:r>
+            <a:endParaRPr lang="de-DE" dirty="0"/>
+          </a:p>
+        </p:txBody>
+      </p:sp>
+      <p:pic>
+        <p:nvPicPr>
+          <p:cNvPr id="5" name="Inhaltsplatzhalter 4">
+            <a:extLst>
+              <a:ext uri="{FF2B5EF4-FFF2-40B4-BE49-F238E27FC236}">
+                <a16:creationId xmlns:a16="http://schemas.microsoft.com/office/drawing/2014/main" id="{2125A55B-D524-BE41-A028-8B9EA64D332E}"/>
+              </a:ext>
+            </a:extLst>
+          </p:cNvPr>
+          <p:cNvPicPr>
+            <a:picLocks noGrp="1" noChangeAspect="1"/>
+          </p:cNvPicPr>
+          <p:nvPr>
+            <p:ph idx="1"/>
+          </p:nvPr>
+        </p:nvPicPr>
+        <p:blipFill>
+          <a:blip r:embed="rId2"/>
+          <a:stretch>
+            <a:fillRect/>
+          </a:stretch>
+        </p:blipFill>
+        <p:spPr>
+          <a:xfrm>
+            <a:off x="676366" y="2437068"/>
+            <a:ext cx="10839268" cy="2951102"/>
+          </a:xfrm>
+        </p:spPr>
+      </p:pic>
+    </p:spTree>
+    <p:extLst>
+      <p:ext uri="{BB962C8B-B14F-4D97-AF65-F5344CB8AC3E}">
+        <p14:creationId xmlns:p14="http://schemas.microsoft.com/office/powerpoint/2010/main" val="1854221080"/>
+      </p:ext>
+    </p:extLst>
+  </p:cSld>
+  <p:clrMapOvr>
+    <a:masterClrMapping/>
+  </p:clrMapOvr>
+</p:sld>
+</file>
+
+<file path=ppt/slides/slide22.xml><?xml version="1.0" encoding="utf-8"?>
+<p:sld xmlns:a="http://schemas.openxmlformats.org/drawingml/2006/main" xmlns:r="http://schemas.openxmlformats.org/officeDocument/2006/relationships" xmlns:p="http://schemas.openxmlformats.org/presentationml/2006/main">
+  <p:cSld>
+    <p:spTree>
+      <p:nvGrpSpPr>
+        <p:cNvPr id="1" name=""/>
+        <p:cNvGrpSpPr/>
+        <p:nvPr/>
+      </p:nvGrpSpPr>
+      <p:grpSpPr>
+        <a:xfrm>
+          <a:off x="0" y="0"/>
+          <a:ext cx="0" cy="0"/>
+          <a:chOff x="0" y="0"/>
+          <a:chExt cx="0" cy="0"/>
+        </a:xfrm>
+      </p:grpSpPr>
+      <p:sp>
+        <p:nvSpPr>
+          <p:cNvPr id="2" name="Titel 1">
+            <a:extLst>
+              <a:ext uri="{FF2B5EF4-FFF2-40B4-BE49-F238E27FC236}">
+                <a16:creationId xmlns:a16="http://schemas.microsoft.com/office/drawing/2014/main" id="{C533C723-4CF5-C240-A4F1-1CDD59D1D793}"/>
+              </a:ext>
+            </a:extLst>
+          </p:cNvPr>
+          <p:cNvSpPr>
+            <a:spLocks noGrp="1"/>
+          </p:cNvSpPr>
+          <p:nvPr>
+            <p:ph type="title"/>
+          </p:nvPr>
+        </p:nvSpPr>
+        <p:spPr/>
+        <p:txBody>
+          <a:bodyPr/>
+          <a:lstStyle/>
+          <a:p>
+            <a:pPr algn="ctr"/>
+            <a:r>
+              <a:rPr lang="de-DE" dirty="0"/>
+              <a:t>TSLA </a:t>
+            </a:r>
+            <a:r>
+              <a:rPr lang="de-DE" dirty="0" err="1"/>
+              <a:t>Volatility</a:t>
+            </a:r>
+            <a:endParaRPr lang="de-DE" dirty="0"/>
+          </a:p>
+        </p:txBody>
+      </p:sp>
+      <p:pic>
+        <p:nvPicPr>
+          <p:cNvPr id="5" name="Inhaltsplatzhalter 4">
+            <a:extLst>
+              <a:ext uri="{FF2B5EF4-FFF2-40B4-BE49-F238E27FC236}">
+                <a16:creationId xmlns:a16="http://schemas.microsoft.com/office/drawing/2014/main" id="{2D5FB1BC-78AF-0343-9BEE-9DEA1CEDDA45}"/>
+              </a:ext>
+            </a:extLst>
+          </p:cNvPr>
+          <p:cNvPicPr>
+            <a:picLocks noGrp="1" noChangeAspect="1"/>
+          </p:cNvPicPr>
+          <p:nvPr>
+            <p:ph idx="1"/>
+          </p:nvPr>
+        </p:nvPicPr>
+        <p:blipFill>
+          <a:blip r:embed="rId2"/>
+          <a:stretch>
+            <a:fillRect/>
+          </a:stretch>
+        </p:blipFill>
+        <p:spPr>
+          <a:xfrm>
+            <a:off x="2239246" y="1690688"/>
+            <a:ext cx="7343024" cy="4599781"/>
+          </a:xfrm>
+        </p:spPr>
+      </p:pic>
+    </p:spTree>
+    <p:extLst>
+      <p:ext uri="{BB962C8B-B14F-4D97-AF65-F5344CB8AC3E}">
+        <p14:creationId xmlns:p14="http://schemas.microsoft.com/office/powerpoint/2010/main" val="362785728"/>
+      </p:ext>
+    </p:extLst>
+  </p:cSld>
+  <p:clrMapOvr>
+    <a:masterClrMapping/>
+  </p:clrMapOvr>
+</p:sld>
+</file>
+
+<file path=ppt/slides/slide23.xml><?xml version="1.0" encoding="utf-8"?>
+<p:sld xmlns:a="http://schemas.openxmlformats.org/drawingml/2006/main" xmlns:r="http://schemas.openxmlformats.org/officeDocument/2006/relationships" xmlns:p="http://schemas.openxmlformats.org/presentationml/2006/main">
+  <p:cSld>
+    <p:spTree>
+      <p:nvGrpSpPr>
+        <p:cNvPr id="1" name=""/>
+        <p:cNvGrpSpPr/>
+        <p:nvPr/>
+      </p:nvGrpSpPr>
+      <p:grpSpPr>
+        <a:xfrm>
+          <a:off x="0" y="0"/>
+          <a:ext cx="0" cy="0"/>
+          <a:chOff x="0" y="0"/>
+          <a:chExt cx="0" cy="0"/>
+        </a:xfrm>
+      </p:grpSpPr>
+      <p:sp>
+        <p:nvSpPr>
+          <p:cNvPr id="2" name="Titel 1">
+            <a:extLst>
+              <a:ext uri="{FF2B5EF4-FFF2-40B4-BE49-F238E27FC236}">
+                <a16:creationId xmlns:a16="http://schemas.microsoft.com/office/drawing/2014/main" id="{4E1DB5AB-0C95-2F4A-9417-B7E54A370E91}"/>
+              </a:ext>
+            </a:extLst>
+          </p:cNvPr>
+          <p:cNvSpPr>
+            <a:spLocks noGrp="1"/>
+          </p:cNvSpPr>
+          <p:nvPr>
+            <p:ph type="title"/>
+          </p:nvPr>
+        </p:nvSpPr>
+        <p:spPr/>
+        <p:txBody>
+          <a:bodyPr/>
+          <a:lstStyle/>
+          <a:p>
+            <a:pPr algn="ctr"/>
+            <a:r>
+              <a:rPr lang="de-DE" dirty="0"/>
+              <a:t>Time Series </a:t>
+            </a:r>
+            <a:r>
+              <a:rPr lang="de-DE" dirty="0" err="1"/>
+              <a:t>Prediction</a:t>
+            </a:r>
+            <a:endParaRPr lang="de-DE" dirty="0"/>
+          </a:p>
+        </p:txBody>
+      </p:sp>
+      <p:pic>
+        <p:nvPicPr>
+          <p:cNvPr id="5" name="Inhaltsplatzhalter 4">
+            <a:extLst>
+              <a:ext uri="{FF2B5EF4-FFF2-40B4-BE49-F238E27FC236}">
+                <a16:creationId xmlns:a16="http://schemas.microsoft.com/office/drawing/2014/main" id="{AFF7A65C-635F-9E40-9042-0CC3C9138343}"/>
+              </a:ext>
+            </a:extLst>
+          </p:cNvPr>
+          <p:cNvPicPr>
+            <a:picLocks noGrp="1" noChangeAspect="1"/>
+          </p:cNvPicPr>
+          <p:nvPr>
+            <p:ph idx="1"/>
+          </p:nvPr>
+        </p:nvPicPr>
+        <p:blipFill>
+          <a:blip r:embed="rId2"/>
+          <a:stretch>
+            <a:fillRect/>
+          </a:stretch>
+        </p:blipFill>
+        <p:spPr>
+          <a:xfrm>
+            <a:off x="2364029" y="1387249"/>
+            <a:ext cx="7463941" cy="5280672"/>
+          </a:xfrm>
+        </p:spPr>
+      </p:pic>
+    </p:spTree>
+    <p:extLst>
+      <p:ext uri="{BB962C8B-B14F-4D97-AF65-F5344CB8AC3E}">
+        <p14:creationId xmlns:p14="http://schemas.microsoft.com/office/powerpoint/2010/main" val="1805671449"/>
+      </p:ext>
+    </p:extLst>
+  </p:cSld>
+  <p:clrMapOvr>
+    <a:masterClrMapping/>
+  </p:clrMapOvr>
+</p:sld>
+</file>
+
+<file path=ppt/slides/slide24.xml><?xml version="1.0" encoding="utf-8"?>
+<p:sld xmlns:a="http://schemas.openxmlformats.org/drawingml/2006/main" xmlns:r="http://schemas.openxmlformats.org/officeDocument/2006/relationships" xmlns:p="http://schemas.openxmlformats.org/presentationml/2006/main">
+  <p:cSld>
+    <p:spTree>
+      <p:nvGrpSpPr>
+        <p:cNvPr id="1" name=""/>
+        <p:cNvGrpSpPr/>
+        <p:nvPr/>
+      </p:nvGrpSpPr>
+      <p:grpSpPr>
+        <a:xfrm>
+          <a:off x="0" y="0"/>
+          <a:ext cx="0" cy="0"/>
+          <a:chOff x="0" y="0"/>
+          <a:chExt cx="0" cy="0"/>
+        </a:xfrm>
+      </p:grpSpPr>
+      <p:sp>
+        <p:nvSpPr>
+          <p:cNvPr id="2" name="Titel 1">
+            <a:extLst>
+              <a:ext uri="{FF2B5EF4-FFF2-40B4-BE49-F238E27FC236}">
+                <a16:creationId xmlns:a16="http://schemas.microsoft.com/office/drawing/2014/main" id="{6A21A11F-B99D-5240-98CE-BF622313C19D}"/>
+              </a:ext>
+            </a:extLst>
+          </p:cNvPr>
+          <p:cNvSpPr>
+            <a:spLocks noGrp="1"/>
+          </p:cNvSpPr>
+          <p:nvPr>
+            <p:ph type="title"/>
+          </p:nvPr>
+        </p:nvSpPr>
+        <p:spPr/>
+        <p:txBody>
+          <a:bodyPr/>
+          <a:lstStyle/>
+          <a:p>
+            <a:pPr algn="ctr"/>
+            <a:r>
+              <a:rPr lang="de-DE" dirty="0" err="1"/>
+              <a:t>Machine</a:t>
+            </a:r>
+            <a:r>
+              <a:rPr lang="de-DE" dirty="0"/>
+              <a:t> Learning</a:t>
+            </a:r>
+          </a:p>
+        </p:txBody>
+      </p:sp>
+      <p:sp>
+        <p:nvSpPr>
+          <p:cNvPr id="3" name="Inhaltsplatzhalter 2">
+            <a:extLst>
+              <a:ext uri="{FF2B5EF4-FFF2-40B4-BE49-F238E27FC236}">
+                <a16:creationId xmlns:a16="http://schemas.microsoft.com/office/drawing/2014/main" id="{066CD88C-F9F0-E042-8BFA-72DC5A3CC198}"/>
+              </a:ext>
+            </a:extLst>
+          </p:cNvPr>
+          <p:cNvSpPr>
+            <a:spLocks noGrp="1"/>
+          </p:cNvSpPr>
+          <p:nvPr>
+            <p:ph idx="1"/>
+          </p:nvPr>
+        </p:nvSpPr>
+        <p:spPr/>
+        <p:txBody>
+          <a:bodyPr/>
+          <a:lstStyle/>
+          <a:p>
+            <a:r>
+              <a:rPr lang="de-DE" dirty="0"/>
+              <a:t>Linear Model</a:t>
+            </a:r>
+          </a:p>
+          <a:p>
+            <a:r>
+              <a:rPr lang="de-DE" dirty="0"/>
+              <a:t>KNN</a:t>
+            </a:r>
+          </a:p>
+          <a:p>
+            <a:r>
+              <a:rPr lang="de-DE" dirty="0" err="1"/>
+              <a:t>Decision</a:t>
+            </a:r>
+            <a:r>
+              <a:rPr lang="de-DE" dirty="0"/>
+              <a:t> </a:t>
+            </a:r>
+            <a:r>
+              <a:rPr lang="de-DE" dirty="0" err="1"/>
+              <a:t>Tree</a:t>
+            </a:r>
+            <a:endParaRPr lang="de-DE" dirty="0"/>
+          </a:p>
+          <a:p>
+            <a:r>
+              <a:rPr lang="de-DE" dirty="0"/>
+              <a:t>Random </a:t>
+            </a:r>
+            <a:r>
+              <a:rPr lang="de-DE" dirty="0" err="1"/>
+              <a:t>Forest</a:t>
+            </a:r>
+            <a:endParaRPr lang="de-DE" dirty="0"/>
+          </a:p>
+          <a:p>
+            <a:r>
+              <a:rPr lang="de-DE" dirty="0" err="1"/>
+              <a:t>Extremely</a:t>
+            </a:r>
+            <a:r>
+              <a:rPr lang="de-DE" dirty="0"/>
+              <a:t> </a:t>
+            </a:r>
+            <a:r>
+              <a:rPr lang="de-DE" dirty="0" err="1"/>
+              <a:t>Randomized</a:t>
+            </a:r>
+            <a:r>
+              <a:rPr lang="de-DE" dirty="0"/>
+              <a:t> </a:t>
+            </a:r>
+            <a:r>
+              <a:rPr lang="de-DE" dirty="0" err="1"/>
+              <a:t>Tree</a:t>
+            </a:r>
+            <a:endParaRPr lang="de-DE" dirty="0"/>
+          </a:p>
+          <a:p>
+            <a:r>
+              <a:rPr lang="de-DE" dirty="0" err="1"/>
+              <a:t>Atrificial</a:t>
+            </a:r>
+            <a:r>
+              <a:rPr lang="de-DE" dirty="0"/>
+              <a:t> </a:t>
+            </a:r>
+            <a:r>
+              <a:rPr lang="de-DE" dirty="0" err="1"/>
+              <a:t>Neural</a:t>
+            </a:r>
+            <a:r>
+              <a:rPr lang="de-DE" dirty="0"/>
+              <a:t> Network</a:t>
+            </a:r>
+          </a:p>
+        </p:txBody>
+      </p:sp>
+    </p:spTree>
+    <p:extLst>
+      <p:ext uri="{BB962C8B-B14F-4D97-AF65-F5344CB8AC3E}">
+        <p14:creationId xmlns:p14="http://schemas.microsoft.com/office/powerpoint/2010/main" val="1944315468"/>
+      </p:ext>
+    </p:extLst>
+  </p:cSld>
+  <p:clrMapOvr>
+    <a:masterClrMapping/>
+  </p:clrMapOvr>
+</p:sld>
+</file>
+
+<file path=ppt/slides/slide25.xml><?xml version="1.0" encoding="utf-8"?>
+<p:sld xmlns:a="http://schemas.openxmlformats.org/drawingml/2006/main" xmlns:r="http://schemas.openxmlformats.org/officeDocument/2006/relationships" xmlns:p="http://schemas.openxmlformats.org/presentationml/2006/main">
+  <p:cSld>
+    <p:spTree>
+      <p:nvGrpSpPr>
+        <p:cNvPr id="1" name=""/>
+        <p:cNvGrpSpPr/>
+        <p:nvPr/>
+      </p:nvGrpSpPr>
+      <p:grpSpPr>
+        <a:xfrm>
+          <a:off x="0" y="0"/>
+          <a:ext cx="0" cy="0"/>
+          <a:chOff x="0" y="0"/>
+          <a:chExt cx="0" cy="0"/>
+        </a:xfrm>
+      </p:grpSpPr>
+      <p:sp>
+        <p:nvSpPr>
+          <p:cNvPr id="2" name="Titel 1">
+            <a:extLst>
+              <a:ext uri="{FF2B5EF4-FFF2-40B4-BE49-F238E27FC236}">
+                <a16:creationId xmlns:a16="http://schemas.microsoft.com/office/drawing/2014/main" id="{6289BDC7-92F6-A041-92C8-04C683DCAF9D}"/>
+              </a:ext>
+            </a:extLst>
+          </p:cNvPr>
+          <p:cNvSpPr>
+            <a:spLocks noGrp="1"/>
+          </p:cNvSpPr>
+          <p:nvPr>
+            <p:ph type="title"/>
+          </p:nvPr>
+        </p:nvSpPr>
+        <p:spPr/>
+        <p:txBody>
+          <a:bodyPr/>
+          <a:lstStyle/>
+          <a:p>
+            <a:pPr algn="ctr"/>
+            <a:r>
+              <a:rPr lang="de-DE" dirty="0" err="1"/>
+              <a:t>Machine</a:t>
+            </a:r>
+            <a:r>
+              <a:rPr lang="de-DE" dirty="0"/>
+              <a:t> Learning v1</a:t>
+            </a:r>
+          </a:p>
+        </p:txBody>
+      </p:sp>
+      <p:pic>
+        <p:nvPicPr>
+          <p:cNvPr id="5" name="Inhaltsplatzhalter 4">
+            <a:extLst>
+              <a:ext uri="{FF2B5EF4-FFF2-40B4-BE49-F238E27FC236}">
+                <a16:creationId xmlns:a16="http://schemas.microsoft.com/office/drawing/2014/main" id="{1E57F784-B5AC-4241-A678-D56422186E8C}"/>
+              </a:ext>
+            </a:extLst>
+          </p:cNvPr>
+          <p:cNvPicPr>
+            <a:picLocks noGrp="1" noChangeAspect="1"/>
+          </p:cNvPicPr>
+          <p:nvPr>
+            <p:ph idx="1"/>
+          </p:nvPr>
+        </p:nvPicPr>
+        <p:blipFill>
+          <a:blip r:embed="rId2"/>
+          <a:stretch>
+            <a:fillRect/>
+          </a:stretch>
+        </p:blipFill>
+        <p:spPr>
+          <a:xfrm>
+            <a:off x="8147027" y="2344950"/>
+            <a:ext cx="2793512" cy="2168099"/>
+          </a:xfrm>
+        </p:spPr>
+      </p:pic>
+      <p:pic>
+        <p:nvPicPr>
+          <p:cNvPr id="9" name="Grafik 8">
+            <a:extLst>
+              <a:ext uri="{FF2B5EF4-FFF2-40B4-BE49-F238E27FC236}">
+                <a16:creationId xmlns:a16="http://schemas.microsoft.com/office/drawing/2014/main" id="{8E49F677-9907-E644-B8A0-E02FEE0E1AEA}"/>
+              </a:ext>
+            </a:extLst>
+          </p:cNvPr>
+          <p:cNvPicPr>
+            <a:picLocks noChangeAspect="1"/>
+          </p:cNvPicPr>
+          <p:nvPr/>
+        </p:nvPicPr>
+        <p:blipFill>
+          <a:blip r:embed="rId3"/>
+          <a:stretch>
+            <a:fillRect/>
+          </a:stretch>
+        </p:blipFill>
+        <p:spPr>
+          <a:xfrm>
+            <a:off x="1251461" y="2523352"/>
+            <a:ext cx="5817048" cy="1811296"/>
+          </a:xfrm>
+          <a:prstGeom prst="rect">
+            <a:avLst/>
+          </a:prstGeom>
+        </p:spPr>
+      </p:pic>
+    </p:spTree>
+    <p:extLst>
+      <p:ext uri="{BB962C8B-B14F-4D97-AF65-F5344CB8AC3E}">
+        <p14:creationId xmlns:p14="http://schemas.microsoft.com/office/powerpoint/2010/main" val="1110860952"/>
+      </p:ext>
+    </p:extLst>
+  </p:cSld>
+  <p:clrMapOvr>
+    <a:masterClrMapping/>
+  </p:clrMapOvr>
+</p:sld>
+</file>
+
+<file path=ppt/slides/slide26.xml><?xml version="1.0" encoding="utf-8"?>
+<p:sld xmlns:a="http://schemas.openxmlformats.org/drawingml/2006/main" xmlns:r="http://schemas.openxmlformats.org/officeDocument/2006/relationships" xmlns:p="http://schemas.openxmlformats.org/presentationml/2006/main">
+  <p:cSld>
+    <p:spTree>
+      <p:nvGrpSpPr>
+        <p:cNvPr id="1" name=""/>
+        <p:cNvGrpSpPr/>
+        <p:nvPr/>
+      </p:nvGrpSpPr>
+      <p:grpSpPr>
+        <a:xfrm>
+          <a:off x="0" y="0"/>
+          <a:ext cx="0" cy="0"/>
+          <a:chOff x="0" y="0"/>
+          <a:chExt cx="0" cy="0"/>
+        </a:xfrm>
+      </p:grpSpPr>
+      <p:pic>
+        <p:nvPicPr>
+          <p:cNvPr id="5" name="Inhaltsplatzhalter 4">
+            <a:extLst>
+              <a:ext uri="{FF2B5EF4-FFF2-40B4-BE49-F238E27FC236}">
+                <a16:creationId xmlns:a16="http://schemas.microsoft.com/office/drawing/2014/main" id="{668EF770-448B-FE48-AEB0-0330D4F53B0D}"/>
+              </a:ext>
+            </a:extLst>
+          </p:cNvPr>
+          <p:cNvPicPr>
+            <a:picLocks noGrp="1"/>
+          </p:cNvPicPr>
+          <p:nvPr>
+            <p:ph idx="1"/>
+          </p:nvPr>
+        </p:nvPicPr>
+        <p:blipFill rotWithShape="1">
+          <a:blip r:embed="rId2"/>
+          <a:srcRect b="49987"/>
+          <a:stretch/>
+        </p:blipFill>
+        <p:spPr>
+          <a:xfrm>
+            <a:off x="1594800" y="190800"/>
+            <a:ext cx="9000000" cy="6480000"/>
+          </a:xfrm>
+        </p:spPr>
+      </p:pic>
+    </p:spTree>
+    <p:extLst>
+      <p:ext uri="{BB962C8B-B14F-4D97-AF65-F5344CB8AC3E}">
+        <p14:creationId xmlns:p14="http://schemas.microsoft.com/office/powerpoint/2010/main" val="1072815853"/>
+      </p:ext>
+    </p:extLst>
+  </p:cSld>
+  <p:clrMapOvr>
+    <a:masterClrMapping/>
+  </p:clrMapOvr>
+</p:sld>
+</file>
+
+<file path=ppt/slides/slide27.xml><?xml version="1.0" encoding="utf-8"?>
+<p:sld xmlns:a="http://schemas.openxmlformats.org/drawingml/2006/main" xmlns:r="http://schemas.openxmlformats.org/officeDocument/2006/relationships" xmlns:p="http://schemas.openxmlformats.org/presentationml/2006/main">
+  <p:cSld>
+    <p:spTree>
+      <p:nvGrpSpPr>
+        <p:cNvPr id="1" name=""/>
+        <p:cNvGrpSpPr/>
+        <p:nvPr/>
+      </p:nvGrpSpPr>
+      <p:grpSpPr>
+        <a:xfrm>
+          <a:off x="0" y="0"/>
+          <a:ext cx="0" cy="0"/>
+          <a:chOff x="0" y="0"/>
+          <a:chExt cx="0" cy="0"/>
+        </a:xfrm>
+      </p:grpSpPr>
+      <p:pic>
+        <p:nvPicPr>
+          <p:cNvPr id="5" name="Inhaltsplatzhalter 4">
+            <a:extLst>
+              <a:ext uri="{FF2B5EF4-FFF2-40B4-BE49-F238E27FC236}">
+                <a16:creationId xmlns:a16="http://schemas.microsoft.com/office/drawing/2014/main" id="{3CF4666E-9CC8-F44A-A956-D2510D3FC69A}"/>
+              </a:ext>
+            </a:extLst>
+          </p:cNvPr>
+          <p:cNvPicPr>
+            <a:picLocks noGrp="1"/>
+          </p:cNvPicPr>
+          <p:nvPr>
+            <p:ph idx="1"/>
+          </p:nvPr>
+        </p:nvPicPr>
+        <p:blipFill rotWithShape="1">
+          <a:blip r:embed="rId2"/>
+          <a:srcRect t="49765"/>
+          <a:stretch/>
+        </p:blipFill>
+        <p:spPr>
+          <a:xfrm>
+            <a:off x="1596000" y="189000"/>
+            <a:ext cx="9000000" cy="6480000"/>
+          </a:xfrm>
+        </p:spPr>
+      </p:pic>
+    </p:spTree>
+    <p:extLst>
+      <p:ext uri="{BB962C8B-B14F-4D97-AF65-F5344CB8AC3E}">
+        <p14:creationId xmlns:p14="http://schemas.microsoft.com/office/powerpoint/2010/main" val="710175067"/>
+      </p:ext>
+    </p:extLst>
+  </p:cSld>
+  <p:clrMapOvr>
+    <a:masterClrMapping/>
+  </p:clrMapOvr>
+</p:sld>
+</file>
+
+<file path=ppt/slides/slide28.xml><?xml version="1.0" encoding="utf-8"?>
+<p:sld xmlns:a="http://schemas.openxmlformats.org/drawingml/2006/main" xmlns:r="http://schemas.openxmlformats.org/officeDocument/2006/relationships" xmlns:p="http://schemas.openxmlformats.org/presentationml/2006/main">
+  <p:cSld>
+    <p:spTree>
+      <p:nvGrpSpPr>
+        <p:cNvPr id="1" name=""/>
+        <p:cNvGrpSpPr/>
+        <p:nvPr/>
+      </p:nvGrpSpPr>
+      <p:grpSpPr>
+        <a:xfrm>
+          <a:off x="0" y="0"/>
+          <a:ext cx="0" cy="0"/>
+          <a:chOff x="0" y="0"/>
+          <a:chExt cx="0" cy="0"/>
+        </a:xfrm>
+      </p:grpSpPr>
+      <p:pic>
+        <p:nvPicPr>
+          <p:cNvPr id="5" name="Inhaltsplatzhalter 4" descr="Ein Bild, das Tisch enthält.&#10;&#10;Automatisch generierte Beschreibung">
+            <a:extLst>
+              <a:ext uri="{FF2B5EF4-FFF2-40B4-BE49-F238E27FC236}">
+                <a16:creationId xmlns:a16="http://schemas.microsoft.com/office/drawing/2014/main" id="{82B993BB-1DD1-B747-940B-108573D7B0F9}"/>
+              </a:ext>
+            </a:extLst>
+          </p:cNvPr>
+          <p:cNvPicPr>
+            <a:picLocks noGrp="1" noChangeAspect="1"/>
+          </p:cNvPicPr>
+          <p:nvPr>
+            <p:ph idx="1"/>
+          </p:nvPr>
+        </p:nvPicPr>
+        <p:blipFill>
+          <a:blip r:embed="rId2"/>
+          <a:stretch>
+            <a:fillRect/>
+          </a:stretch>
+        </p:blipFill>
+        <p:spPr>
+          <a:xfrm>
+            <a:off x="838200" y="1554328"/>
+            <a:ext cx="10515600" cy="3749343"/>
+          </a:xfrm>
+        </p:spPr>
+      </p:pic>
+    </p:spTree>
+    <p:extLst>
+      <p:ext uri="{BB962C8B-B14F-4D97-AF65-F5344CB8AC3E}">
+        <p14:creationId xmlns:p14="http://schemas.microsoft.com/office/powerpoint/2010/main" val="1862352692"/>
+      </p:ext>
+    </p:extLst>
+  </p:cSld>
+  <p:clrMapOvr>
+    <a:masterClrMapping/>
+  </p:clrMapOvr>
+</p:sld>
+</file>
+
+<file path=ppt/slides/slide29.xml><?xml version="1.0" encoding="utf-8"?>
+<p:sld xmlns:a="http://schemas.openxmlformats.org/drawingml/2006/main" xmlns:r="http://schemas.openxmlformats.org/officeDocument/2006/relationships" xmlns:p="http://schemas.openxmlformats.org/presentationml/2006/main">
+  <p:cSld>
+    <p:spTree>
+      <p:nvGrpSpPr>
+        <p:cNvPr id="1" name=""/>
+        <p:cNvGrpSpPr/>
+        <p:nvPr/>
+      </p:nvGrpSpPr>
+      <p:grpSpPr>
+        <a:xfrm>
+          <a:off x="0" y="0"/>
+          <a:ext cx="0" cy="0"/>
+          <a:chOff x="0" y="0"/>
+          <a:chExt cx="0" cy="0"/>
+        </a:xfrm>
+      </p:grpSpPr>
+      <p:sp>
+        <p:nvSpPr>
+          <p:cNvPr id="2" name="Titel 1">
+            <a:extLst>
+              <a:ext uri="{FF2B5EF4-FFF2-40B4-BE49-F238E27FC236}">
+                <a16:creationId xmlns:a16="http://schemas.microsoft.com/office/drawing/2014/main" id="{CCECC5B2-192B-E64F-87E5-88CCFF359FE4}"/>
+              </a:ext>
+            </a:extLst>
+          </p:cNvPr>
+          <p:cNvSpPr>
+            <a:spLocks noGrp="1"/>
+          </p:cNvSpPr>
+          <p:nvPr>
+            <p:ph type="title"/>
+          </p:nvPr>
+        </p:nvSpPr>
+        <p:spPr/>
+        <p:txBody>
+          <a:bodyPr/>
+          <a:lstStyle/>
+          <a:p>
+            <a:pPr algn="ctr"/>
+            <a:r>
+              <a:rPr lang="de-DE" dirty="0" err="1"/>
+              <a:t>Machine</a:t>
+            </a:r>
+            <a:r>
+              <a:rPr lang="de-DE" dirty="0"/>
+              <a:t> Learning v2</a:t>
+            </a:r>
+          </a:p>
+        </p:txBody>
+      </p:sp>
+      <p:pic>
+        <p:nvPicPr>
+          <p:cNvPr id="5" name="Inhaltsplatzhalter 4">
+            <a:extLst>
+              <a:ext uri="{FF2B5EF4-FFF2-40B4-BE49-F238E27FC236}">
+                <a16:creationId xmlns:a16="http://schemas.microsoft.com/office/drawing/2014/main" id="{AD92E46F-DD6D-9043-AB41-D44BD387D4BD}"/>
+              </a:ext>
+            </a:extLst>
+          </p:cNvPr>
+          <p:cNvPicPr>
+            <a:picLocks noGrp="1" noChangeAspect="1"/>
+          </p:cNvPicPr>
+          <p:nvPr>
+            <p:ph idx="1"/>
+          </p:nvPr>
+        </p:nvPicPr>
+        <p:blipFill>
+          <a:blip r:embed="rId2"/>
+          <a:stretch>
+            <a:fillRect/>
+          </a:stretch>
+        </p:blipFill>
+        <p:spPr>
+          <a:xfrm>
+            <a:off x="526086" y="2103436"/>
+            <a:ext cx="11139828" cy="1325563"/>
+          </a:xfrm>
+        </p:spPr>
+      </p:pic>
+      <p:pic>
+        <p:nvPicPr>
+          <p:cNvPr id="7" name="Grafik 6">
+            <a:extLst>
+              <a:ext uri="{FF2B5EF4-FFF2-40B4-BE49-F238E27FC236}">
+                <a16:creationId xmlns:a16="http://schemas.microsoft.com/office/drawing/2014/main" id="{C325FEDF-4643-D948-BAA1-5E2422FB9424}"/>
+              </a:ext>
+            </a:extLst>
+          </p:cNvPr>
+          <p:cNvPicPr>
+            <a:picLocks noChangeAspect="1"/>
+          </p:cNvPicPr>
+          <p:nvPr/>
+        </p:nvPicPr>
+        <p:blipFill>
+          <a:blip r:embed="rId3"/>
+          <a:stretch>
+            <a:fillRect/>
+          </a:stretch>
+        </p:blipFill>
+        <p:spPr>
+          <a:xfrm>
+            <a:off x="526086" y="4411784"/>
+            <a:ext cx="3576991" cy="1476219"/>
+          </a:xfrm>
+          <a:prstGeom prst="rect">
+            <a:avLst/>
+          </a:prstGeom>
+        </p:spPr>
+      </p:pic>
+    </p:spTree>
+    <p:extLst>
+      <p:ext uri="{BB962C8B-B14F-4D97-AF65-F5344CB8AC3E}">
+        <p14:creationId xmlns:p14="http://schemas.microsoft.com/office/powerpoint/2010/main" val="2851614272"/>
+      </p:ext>
+    </p:extLst>
+  </p:cSld>
+  <p:clrMapOvr>
+    <a:masterClrMapping/>
+  </p:clrMapOvr>
+</p:sld>
+</file>
+
+<file path=ppt/slides/slide3.xml><?xml version="1.0" encoding="utf-8"?>
+<p:sld xmlns:a="http://schemas.openxmlformats.org/drawingml/2006/main" xmlns:r="http://schemas.openxmlformats.org/officeDocument/2006/relationships" xmlns:p="http://schemas.openxmlformats.org/presentationml/2006/main">
+  <p:cSld>
+    <p:spTree>
+      <p:nvGrpSpPr>
+        <p:cNvPr id="1" name=""/>
+        <p:cNvGrpSpPr/>
+        <p:nvPr/>
+      </p:nvGrpSpPr>
+      <p:grpSpPr>
+        <a:xfrm>
+          <a:off x="0" y="0"/>
+          <a:ext cx="0" cy="0"/>
+          <a:chOff x="0" y="0"/>
+          <a:chExt cx="0" cy="0"/>
+        </a:xfrm>
+      </p:grpSpPr>
+      <p:sp>
+        <p:nvSpPr>
+          <p:cNvPr id="2" name="Titel 1">
+            <a:extLst>
+              <a:ext uri="{FF2B5EF4-FFF2-40B4-BE49-F238E27FC236}">
+                <a16:creationId xmlns:a16="http://schemas.microsoft.com/office/drawing/2014/main" id="{DAB770D3-2F3C-9F41-B7CD-0FAFABEE211F}"/>
+              </a:ext>
+            </a:extLst>
+          </p:cNvPr>
+          <p:cNvSpPr>
+            <a:spLocks noGrp="1"/>
+          </p:cNvSpPr>
+          <p:nvPr>
+            <p:ph type="title"/>
+          </p:nvPr>
+        </p:nvSpPr>
+        <p:spPr/>
+        <p:txBody>
+          <a:bodyPr/>
+          <a:lstStyle/>
+          <a:p>
+            <a:pPr algn="ctr"/>
+            <a:r>
+              <a:rPr lang="de-DE" dirty="0"/>
+              <a:t>Tesla Stock</a:t>
+            </a:r>
+          </a:p>
+        </p:txBody>
+      </p:sp>
+      <p:pic>
+        <p:nvPicPr>
+          <p:cNvPr id="5" name="Inhaltsplatzhalter 4">
+            <a:extLst>
+              <a:ext uri="{FF2B5EF4-FFF2-40B4-BE49-F238E27FC236}">
+                <a16:creationId xmlns:a16="http://schemas.microsoft.com/office/drawing/2014/main" id="{8C67E5D5-9BD2-634A-B01A-3F581A3F6257}"/>
+              </a:ext>
+            </a:extLst>
+          </p:cNvPr>
+          <p:cNvPicPr>
+            <a:picLocks noGrp="1"/>
+          </p:cNvPicPr>
+          <p:nvPr>
+            <p:ph idx="1"/>
+          </p:nvPr>
+        </p:nvPicPr>
+        <p:blipFill>
+          <a:blip r:embed="rId2"/>
+          <a:stretch>
+            <a:fillRect/>
+          </a:stretch>
+        </p:blipFill>
+        <p:spPr>
+          <a:xfrm>
+            <a:off x="2659691" y="1690688"/>
+            <a:ext cx="6120000" cy="4680000"/>
+          </a:xfrm>
+        </p:spPr>
+      </p:pic>
+    </p:spTree>
+    <p:extLst>
+      <p:ext uri="{BB962C8B-B14F-4D97-AF65-F5344CB8AC3E}">
+        <p14:creationId xmlns:p14="http://schemas.microsoft.com/office/powerpoint/2010/main" val="3510781325"/>
+      </p:ext>
+    </p:extLst>
+  </p:cSld>
+  <p:clrMapOvr>
+    <a:masterClrMapping/>
+  </p:clrMapOvr>
+</p:sld>
+</file>
+
+<file path=ppt/slides/slide30.xml><?xml version="1.0" encoding="utf-8"?>
+<p:sld xmlns:a="http://schemas.openxmlformats.org/drawingml/2006/main" xmlns:r="http://schemas.openxmlformats.org/officeDocument/2006/relationships" xmlns:p="http://schemas.openxmlformats.org/presentationml/2006/main">
+  <p:cSld>
+    <p:spTree>
+      <p:nvGrpSpPr>
+        <p:cNvPr id="1" name=""/>
+        <p:cNvGrpSpPr/>
+        <p:nvPr/>
+      </p:nvGrpSpPr>
+      <p:grpSpPr>
+        <a:xfrm>
+          <a:off x="0" y="0"/>
+          <a:ext cx="0" cy="0"/>
+          <a:chOff x="0" y="0"/>
+          <a:chExt cx="0" cy="0"/>
+        </a:xfrm>
+      </p:grpSpPr>
+      <p:pic>
+        <p:nvPicPr>
+          <p:cNvPr id="5" name="Inhaltsplatzhalter 4">
+            <a:extLst>
+              <a:ext uri="{FF2B5EF4-FFF2-40B4-BE49-F238E27FC236}">
+                <a16:creationId xmlns:a16="http://schemas.microsoft.com/office/drawing/2014/main" id="{8B42821D-BF44-5A4C-84EA-09FDA65EBB89}"/>
+              </a:ext>
+            </a:extLst>
+          </p:cNvPr>
+          <p:cNvPicPr>
+            <a:picLocks noGrp="1"/>
+          </p:cNvPicPr>
+          <p:nvPr>
+            <p:ph idx="1"/>
+          </p:nvPr>
+        </p:nvPicPr>
+        <p:blipFill rotWithShape="1">
+          <a:blip r:embed="rId2"/>
+          <a:srcRect b="49990"/>
+          <a:stretch/>
+        </p:blipFill>
+        <p:spPr>
+          <a:xfrm>
+            <a:off x="1596000" y="189000"/>
+            <a:ext cx="9000000" cy="6480000"/>
+          </a:xfrm>
+        </p:spPr>
+      </p:pic>
+    </p:spTree>
+    <p:extLst>
+      <p:ext uri="{BB962C8B-B14F-4D97-AF65-F5344CB8AC3E}">
+        <p14:creationId xmlns:p14="http://schemas.microsoft.com/office/powerpoint/2010/main" val="1110446983"/>
+      </p:ext>
+    </p:extLst>
+  </p:cSld>
+  <p:clrMapOvr>
+    <a:masterClrMapping/>
+  </p:clrMapOvr>
+</p:sld>
+</file>
+
+<file path=ppt/slides/slide31.xml><?xml version="1.0" encoding="utf-8"?>
+<p:sld xmlns:a="http://schemas.openxmlformats.org/drawingml/2006/main" xmlns:r="http://schemas.openxmlformats.org/officeDocument/2006/relationships" xmlns:p="http://schemas.openxmlformats.org/presentationml/2006/main">
+  <p:cSld>
+    <p:spTree>
+      <p:nvGrpSpPr>
+        <p:cNvPr id="1" name=""/>
+        <p:cNvGrpSpPr/>
+        <p:nvPr/>
+      </p:nvGrpSpPr>
+      <p:grpSpPr>
+        <a:xfrm>
+          <a:off x="0" y="0"/>
+          <a:ext cx="0" cy="0"/>
+          <a:chOff x="0" y="0"/>
+          <a:chExt cx="0" cy="0"/>
+        </a:xfrm>
+      </p:grpSpPr>
+      <p:pic>
+        <p:nvPicPr>
+          <p:cNvPr id="5" name="Inhaltsplatzhalter 4">
+            <a:extLst>
+              <a:ext uri="{FF2B5EF4-FFF2-40B4-BE49-F238E27FC236}">
+                <a16:creationId xmlns:a16="http://schemas.microsoft.com/office/drawing/2014/main" id="{E7EE16AE-0CEA-5742-9412-5FD1CBBBD3AB}"/>
+              </a:ext>
+            </a:extLst>
+          </p:cNvPr>
+          <p:cNvPicPr>
+            <a:picLocks noGrp="1"/>
+          </p:cNvPicPr>
+          <p:nvPr>
+            <p:ph idx="1"/>
+          </p:nvPr>
+        </p:nvPicPr>
+        <p:blipFill rotWithShape="1">
+          <a:blip r:embed="rId2"/>
+          <a:srcRect t="49857"/>
+          <a:stretch/>
+        </p:blipFill>
+        <p:spPr>
+          <a:xfrm>
+            <a:off x="1596000" y="189000"/>
+            <a:ext cx="9000000" cy="6480000"/>
+          </a:xfrm>
+        </p:spPr>
+      </p:pic>
+    </p:spTree>
+    <p:extLst>
+      <p:ext uri="{BB962C8B-B14F-4D97-AF65-F5344CB8AC3E}">
+        <p14:creationId xmlns:p14="http://schemas.microsoft.com/office/powerpoint/2010/main" val="515125218"/>
+      </p:ext>
+    </p:extLst>
+  </p:cSld>
+  <p:clrMapOvr>
+    <a:masterClrMapping/>
+  </p:clrMapOvr>
+</p:sld>
+</file>
+
+<file path=ppt/slides/slide32.xml><?xml version="1.0" encoding="utf-8"?>
+<p:sld xmlns:a="http://schemas.openxmlformats.org/drawingml/2006/main" xmlns:r="http://schemas.openxmlformats.org/officeDocument/2006/relationships" xmlns:p="http://schemas.openxmlformats.org/presentationml/2006/main">
+  <p:cSld>
+    <p:spTree>
+      <p:nvGrpSpPr>
+        <p:cNvPr id="1" name=""/>
+        <p:cNvGrpSpPr/>
+        <p:nvPr/>
+      </p:nvGrpSpPr>
+      <p:grpSpPr>
+        <a:xfrm>
+          <a:off x="0" y="0"/>
+          <a:ext cx="0" cy="0"/>
+          <a:chOff x="0" y="0"/>
+          <a:chExt cx="0" cy="0"/>
+        </a:xfrm>
+      </p:grpSpPr>
+      <p:pic>
+        <p:nvPicPr>
+          <p:cNvPr id="5" name="Inhaltsplatzhalter 4" descr="Ein Bild, das Tisch enthält.&#10;&#10;Automatisch generierte Beschreibung">
+            <a:extLst>
+              <a:ext uri="{FF2B5EF4-FFF2-40B4-BE49-F238E27FC236}">
+                <a16:creationId xmlns:a16="http://schemas.microsoft.com/office/drawing/2014/main" id="{1B80A5D1-049F-1A44-9699-83D0B30B1632}"/>
+              </a:ext>
+            </a:extLst>
+          </p:cNvPr>
+          <p:cNvPicPr>
+            <a:picLocks noGrp="1" noChangeAspect="1"/>
+          </p:cNvPicPr>
+          <p:nvPr>
+            <p:ph idx="1"/>
+          </p:nvPr>
+        </p:nvPicPr>
+        <p:blipFill>
+          <a:blip r:embed="rId2"/>
+          <a:stretch>
+            <a:fillRect/>
+          </a:stretch>
+        </p:blipFill>
+        <p:spPr>
+          <a:xfrm>
+            <a:off x="838200" y="1554328"/>
+            <a:ext cx="10515600" cy="3749343"/>
+          </a:xfrm>
+        </p:spPr>
+      </p:pic>
+    </p:spTree>
+    <p:extLst>
+      <p:ext uri="{BB962C8B-B14F-4D97-AF65-F5344CB8AC3E}">
+        <p14:creationId xmlns:p14="http://schemas.microsoft.com/office/powerpoint/2010/main" val="3544796684"/>
+      </p:ext>
+    </p:extLst>
+  </p:cSld>
+  <p:clrMapOvr>
+    <a:masterClrMapping/>
+  </p:clrMapOvr>
+</p:sld>
+</file>
+
+<file path=ppt/slides/slide33.xml><?xml version="1.0" encoding="utf-8"?>
+<p:sld xmlns:a="http://schemas.openxmlformats.org/drawingml/2006/main" xmlns:r="http://schemas.openxmlformats.org/officeDocument/2006/relationships" xmlns:p="http://schemas.openxmlformats.org/presentationml/2006/main">
+  <p:cSld>
+    <p:spTree>
+      <p:nvGrpSpPr>
+        <p:cNvPr id="1" name=""/>
+        <p:cNvGrpSpPr/>
+        <p:nvPr/>
+      </p:nvGrpSpPr>
+      <p:grpSpPr>
+        <a:xfrm>
+          <a:off x="0" y="0"/>
+          <a:ext cx="0" cy="0"/>
+          <a:chOff x="0" y="0"/>
+          <a:chExt cx="0" cy="0"/>
+        </a:xfrm>
+      </p:grpSpPr>
+      <p:sp>
+        <p:nvSpPr>
+          <p:cNvPr id="2" name="Titel 1">
+            <a:extLst>
+              <a:ext uri="{FF2B5EF4-FFF2-40B4-BE49-F238E27FC236}">
+                <a16:creationId xmlns:a16="http://schemas.microsoft.com/office/drawing/2014/main" id="{93CFC38F-D881-CE46-B72D-9FE6762477D8}"/>
+              </a:ext>
+            </a:extLst>
+          </p:cNvPr>
+          <p:cNvSpPr>
+            <a:spLocks noGrp="1"/>
+          </p:cNvSpPr>
+          <p:nvPr>
+            <p:ph type="title"/>
+          </p:nvPr>
+        </p:nvSpPr>
+        <p:spPr/>
+        <p:txBody>
+          <a:bodyPr/>
+          <a:lstStyle/>
+          <a:p>
+            <a:pPr algn="ctr"/>
+            <a:r>
+              <a:rPr lang="de-DE" dirty="0" err="1"/>
+              <a:t>Conclusion</a:t>
+            </a:r>
+            <a:endParaRPr lang="de-DE" dirty="0"/>
+          </a:p>
+        </p:txBody>
+      </p:sp>
+      <p:sp>
+        <p:nvSpPr>
+          <p:cNvPr id="3" name="Inhaltsplatzhalter 2">
+            <a:extLst>
+              <a:ext uri="{FF2B5EF4-FFF2-40B4-BE49-F238E27FC236}">
+                <a16:creationId xmlns:a16="http://schemas.microsoft.com/office/drawing/2014/main" id="{489614B7-FCF3-E34B-917F-355610CF6A09}"/>
+              </a:ext>
+            </a:extLst>
+          </p:cNvPr>
+          <p:cNvSpPr>
+            <a:spLocks noGrp="1"/>
+          </p:cNvSpPr>
+          <p:nvPr>
+            <p:ph idx="1"/>
+          </p:nvPr>
+        </p:nvSpPr>
+        <p:spPr/>
+        <p:txBody>
+          <a:bodyPr/>
+          <a:lstStyle/>
+          <a:p>
+            <a:r>
+              <a:rPr lang="de-DE" dirty="0" err="1"/>
+              <a:t>Preprocessing</a:t>
+            </a:r>
+            <a:endParaRPr lang="de-DE" dirty="0"/>
+          </a:p>
+          <a:p>
+            <a:r>
+              <a:rPr lang="de-DE" dirty="0" err="1"/>
+              <a:t>Confidence</a:t>
+            </a:r>
+            <a:r>
+              <a:rPr lang="de-DE" dirty="0"/>
+              <a:t> </a:t>
+            </a:r>
+            <a:r>
+              <a:rPr lang="de-DE" dirty="0" err="1"/>
+              <a:t>intervals</a:t>
+            </a:r>
+            <a:endParaRPr lang="de-DE" dirty="0"/>
+          </a:p>
+        </p:txBody>
+      </p:sp>
+    </p:spTree>
+    <p:extLst>
+      <p:ext uri="{BB962C8B-B14F-4D97-AF65-F5344CB8AC3E}">
+        <p14:creationId xmlns:p14="http://schemas.microsoft.com/office/powerpoint/2010/main" val="1471381564"/>
+      </p:ext>
+    </p:extLst>
+  </p:cSld>
+  <p:clrMapOvr>
+    <a:masterClrMapping/>
+  </p:clrMapOvr>
+</p:sld>
+</file>
+
+<file path=ppt/slides/slide4.xml><?xml version="1.0" encoding="utf-8"?>
+<p:sld xmlns:a="http://schemas.openxmlformats.org/drawingml/2006/main" xmlns:r="http://schemas.openxmlformats.org/officeDocument/2006/relationships" xmlns:p="http://schemas.openxmlformats.org/presentationml/2006/main">
+  <p:cSld>
+    <p:spTree>
+      <p:nvGrpSpPr>
+        <p:cNvPr id="1" name=""/>
+        <p:cNvGrpSpPr/>
+        <p:nvPr/>
+      </p:nvGrpSpPr>
+      <p:grpSpPr>
+        <a:xfrm>
+          <a:off x="0" y="0"/>
+          <a:ext cx="0" cy="0"/>
+          <a:chOff x="0" y="0"/>
+          <a:chExt cx="0" cy="0"/>
+        </a:xfrm>
+      </p:grpSpPr>
+      <p:sp>
+        <p:nvSpPr>
+          <p:cNvPr id="2" name="Titel 1">
+            <a:extLst>
+              <a:ext uri="{FF2B5EF4-FFF2-40B4-BE49-F238E27FC236}">
+                <a16:creationId xmlns:a16="http://schemas.microsoft.com/office/drawing/2014/main" id="{0D8396D9-7E1B-1648-9143-BC8A39447BD2}"/>
+              </a:ext>
+            </a:extLst>
+          </p:cNvPr>
+          <p:cNvSpPr>
+            <a:spLocks noGrp="1"/>
+          </p:cNvSpPr>
+          <p:nvPr>
+            <p:ph type="title"/>
+          </p:nvPr>
+        </p:nvSpPr>
+        <p:spPr/>
+        <p:txBody>
+          <a:bodyPr/>
+          <a:lstStyle/>
+          <a:p>
+            <a:pPr algn="ctr"/>
+            <a:r>
+              <a:rPr lang="de-DE" dirty="0"/>
+              <a:t>Tesla Stock</a:t>
+            </a:r>
+          </a:p>
+        </p:txBody>
+      </p:sp>
+      <p:pic>
+        <p:nvPicPr>
+          <p:cNvPr id="5" name="Inhaltsplatzhalter 4">
+            <a:extLst>
+              <a:ext uri="{FF2B5EF4-FFF2-40B4-BE49-F238E27FC236}">
+                <a16:creationId xmlns:a16="http://schemas.microsoft.com/office/drawing/2014/main" id="{4AC12B92-20BB-0041-B4E1-A4841BD1B4A2}"/>
+              </a:ext>
+            </a:extLst>
+          </p:cNvPr>
+          <p:cNvPicPr>
+            <a:picLocks noGrp="1"/>
+          </p:cNvPicPr>
+          <p:nvPr>
+            <p:ph idx="1"/>
+          </p:nvPr>
+        </p:nvPicPr>
+        <p:blipFill>
+          <a:blip r:embed="rId2"/>
+          <a:stretch>
+            <a:fillRect/>
+          </a:stretch>
+        </p:blipFill>
+        <p:spPr>
+          <a:xfrm>
+            <a:off x="2691442" y="1690688"/>
+            <a:ext cx="6120000" cy="4680000"/>
+          </a:xfrm>
+        </p:spPr>
+      </p:pic>
+    </p:spTree>
+    <p:extLst>
+      <p:ext uri="{BB962C8B-B14F-4D97-AF65-F5344CB8AC3E}">
+        <p14:creationId xmlns:p14="http://schemas.microsoft.com/office/powerpoint/2010/main" val="566414860"/>
+      </p:ext>
+    </p:extLst>
+  </p:cSld>
+  <p:clrMapOvr>
+    <a:masterClrMapping/>
+  </p:clrMapOvr>
+</p:sld>
+</file>
+
+<file path=ppt/slides/slide5.xml><?xml version="1.0" encoding="utf-8"?>
+<p:sld xmlns:a="http://schemas.openxmlformats.org/drawingml/2006/main" xmlns:r="http://schemas.openxmlformats.org/officeDocument/2006/relationships" xmlns:p="http://schemas.openxmlformats.org/presentationml/2006/main">
+  <p:cSld>
+    <p:spTree>
+      <p:nvGrpSpPr>
+        <p:cNvPr id="1" name=""/>
+        <p:cNvGrpSpPr/>
+        <p:nvPr/>
+      </p:nvGrpSpPr>
+      <p:grpSpPr>
+        <a:xfrm>
+          <a:off x="0" y="0"/>
+          <a:ext cx="0" cy="0"/>
+          <a:chOff x="0" y="0"/>
+          <a:chExt cx="0" cy="0"/>
+        </a:xfrm>
+      </p:grpSpPr>
+      <p:sp>
+        <p:nvSpPr>
+          <p:cNvPr id="2" name="Titel 1">
+            <a:extLst>
+              <a:ext uri="{FF2B5EF4-FFF2-40B4-BE49-F238E27FC236}">
+                <a16:creationId xmlns:a16="http://schemas.microsoft.com/office/drawing/2014/main" id="{4EC3F683-4768-8F4C-8F34-E2254AD04941}"/>
+              </a:ext>
+            </a:extLst>
+          </p:cNvPr>
+          <p:cNvSpPr>
+            <a:spLocks noGrp="1"/>
+          </p:cNvSpPr>
+          <p:nvPr>
+            <p:ph type="title"/>
+          </p:nvPr>
+        </p:nvSpPr>
+        <p:spPr/>
+        <p:txBody>
+          <a:bodyPr/>
+          <a:lstStyle/>
+          <a:p>
+            <a:pPr algn="ctr"/>
+            <a:r>
+              <a:rPr lang="de-DE" dirty="0"/>
+              <a:t>Google Trends</a:t>
+            </a:r>
+          </a:p>
+        </p:txBody>
+      </p:sp>
+      <p:pic>
+        <p:nvPicPr>
+          <p:cNvPr id="5" name="Inhaltsplatzhalter 4">
+            <a:extLst>
+              <a:ext uri="{FF2B5EF4-FFF2-40B4-BE49-F238E27FC236}">
+                <a16:creationId xmlns:a16="http://schemas.microsoft.com/office/drawing/2014/main" id="{19ABB9B1-20DF-934D-952C-A1D66FF249AB}"/>
+              </a:ext>
+            </a:extLst>
+          </p:cNvPr>
+          <p:cNvPicPr>
+            <a:picLocks noGrp="1" noChangeAspect="1"/>
+          </p:cNvPicPr>
+          <p:nvPr>
+            <p:ph idx="1"/>
+          </p:nvPr>
+        </p:nvPicPr>
+        <p:blipFill>
+          <a:blip r:embed="rId2"/>
+          <a:stretch>
+            <a:fillRect/>
+          </a:stretch>
+        </p:blipFill>
+        <p:spPr>
+          <a:xfrm>
+            <a:off x="1721840" y="1825625"/>
+            <a:ext cx="8748319" cy="4351338"/>
+          </a:xfrm>
+        </p:spPr>
+      </p:pic>
+    </p:spTree>
+    <p:extLst>
+      <p:ext uri="{BB962C8B-B14F-4D97-AF65-F5344CB8AC3E}">
+        <p14:creationId xmlns:p14="http://schemas.microsoft.com/office/powerpoint/2010/main" val="3072336845"/>
+      </p:ext>
+    </p:extLst>
+  </p:cSld>
+  <p:clrMapOvr>
+    <a:masterClrMapping/>
+  </p:clrMapOvr>
+</p:sld>
+</file>
+
+<file path=ppt/slides/slide6.xml><?xml version="1.0" encoding="utf-8"?>
+<p:sld xmlns:a="http://schemas.openxmlformats.org/drawingml/2006/main" xmlns:r="http://schemas.openxmlformats.org/officeDocument/2006/relationships" xmlns:p="http://schemas.openxmlformats.org/presentationml/2006/main">
+  <p:cSld>
+    <p:spTree>
+      <p:nvGrpSpPr>
+        <p:cNvPr id="1" name=""/>
+        <p:cNvGrpSpPr/>
+        <p:nvPr/>
+      </p:nvGrpSpPr>
+      <p:grpSpPr>
+        <a:xfrm>
+          <a:off x="0" y="0"/>
+          <a:ext cx="0" cy="0"/>
+          <a:chOff x="0" y="0"/>
+          <a:chExt cx="0" cy="0"/>
+        </a:xfrm>
+      </p:grpSpPr>
+      <p:sp>
+        <p:nvSpPr>
+          <p:cNvPr id="2" name="Titel 1">
+            <a:extLst>
+              <a:ext uri="{FF2B5EF4-FFF2-40B4-BE49-F238E27FC236}">
+                <a16:creationId xmlns:a16="http://schemas.microsoft.com/office/drawing/2014/main" id="{7600F580-CE8B-9845-912B-40415281C8A3}"/>
+              </a:ext>
+            </a:extLst>
+          </p:cNvPr>
+          <p:cNvSpPr>
+            <a:spLocks noGrp="1"/>
+          </p:cNvSpPr>
+          <p:nvPr>
+            <p:ph type="title"/>
+          </p:nvPr>
+        </p:nvSpPr>
+        <p:spPr/>
+        <p:txBody>
+          <a:bodyPr/>
+          <a:lstStyle/>
+          <a:p>
+            <a:pPr algn="ctr"/>
+            <a:r>
+              <a:rPr lang="de-DE" dirty="0"/>
+              <a:t>Search Terms</a:t>
+            </a:r>
+          </a:p>
+        </p:txBody>
+      </p:sp>
+      <p:sp>
+        <p:nvSpPr>
+          <p:cNvPr id="3" name="Inhaltsplatzhalter 2">
+            <a:extLst>
+              <a:ext uri="{FF2B5EF4-FFF2-40B4-BE49-F238E27FC236}">
+                <a16:creationId xmlns:a16="http://schemas.microsoft.com/office/drawing/2014/main" id="{7B5FFF33-A4C7-1742-8671-45C9223606FE}"/>
+              </a:ext>
+            </a:extLst>
+          </p:cNvPr>
+          <p:cNvSpPr>
+            <a:spLocks noGrp="1"/>
+          </p:cNvSpPr>
+          <p:nvPr>
+            <p:ph idx="1"/>
+          </p:nvPr>
+        </p:nvSpPr>
+        <p:spPr/>
+        <p:txBody>
+          <a:bodyPr/>
+          <a:lstStyle/>
+          <a:p>
+            <a:r>
+              <a:rPr lang="de-DE" dirty="0"/>
+              <a:t>„Tesla“</a:t>
+            </a:r>
+          </a:p>
+          <a:p>
+            <a:r>
+              <a:rPr lang="de-DE" dirty="0"/>
+              <a:t>„TSLA“</a:t>
+            </a:r>
+          </a:p>
+          <a:p>
+            <a:r>
+              <a:rPr lang="de-DE" dirty="0"/>
+              <a:t>„</a:t>
+            </a:r>
+            <a:r>
+              <a:rPr lang="de-DE" dirty="0" err="1"/>
+              <a:t>Musk</a:t>
+            </a:r>
+            <a:r>
+              <a:rPr lang="de-DE" dirty="0"/>
+              <a:t>“</a:t>
+            </a:r>
+          </a:p>
+          <a:p>
+            <a:r>
+              <a:rPr lang="de-DE" dirty="0"/>
+              <a:t>„Tesla stock“</a:t>
+            </a:r>
+          </a:p>
+          <a:p>
+            <a:endParaRPr lang="de-DE" dirty="0"/>
+          </a:p>
+        </p:txBody>
+      </p:sp>
+    </p:spTree>
+    <p:extLst>
+      <p:ext uri="{BB962C8B-B14F-4D97-AF65-F5344CB8AC3E}">
+        <p14:creationId xmlns:p14="http://schemas.microsoft.com/office/powerpoint/2010/main" val="2985153095"/>
+      </p:ext>
+    </p:extLst>
+  </p:cSld>
+  <p:clrMapOvr>
+    <a:masterClrMapping/>
+  </p:clrMapOvr>
+</p:sld>
+</file>
+
+<file path=ppt/slides/slide7.xml><?xml version="1.0" encoding="utf-8"?>
+<p:sld xmlns:a="http://schemas.openxmlformats.org/drawingml/2006/main" xmlns:r="http://schemas.openxmlformats.org/officeDocument/2006/relationships" xmlns:p="http://schemas.openxmlformats.org/presentationml/2006/main">
+  <p:cSld>
+    <p:spTree>
+      <p:nvGrpSpPr>
+        <p:cNvPr id="1" name=""/>
+        <p:cNvGrpSpPr/>
+        <p:nvPr/>
+      </p:nvGrpSpPr>
+      <p:grpSpPr>
+        <a:xfrm>
+          <a:off x="0" y="0"/>
+          <a:ext cx="0" cy="0"/>
+          <a:chOff x="0" y="0"/>
+          <a:chExt cx="0" cy="0"/>
+        </a:xfrm>
+      </p:grpSpPr>
+      <p:sp>
+        <p:nvSpPr>
+          <p:cNvPr id="2" name="Titel 1">
+            <a:extLst>
+              <a:ext uri="{FF2B5EF4-FFF2-40B4-BE49-F238E27FC236}">
+                <a16:creationId xmlns:a16="http://schemas.microsoft.com/office/drawing/2014/main" id="{3BFEF6DA-1FA8-734F-8320-333E61723D92}"/>
+              </a:ext>
+            </a:extLst>
+          </p:cNvPr>
+          <p:cNvSpPr>
+            <a:spLocks noGrp="1"/>
+          </p:cNvSpPr>
+          <p:nvPr>
+            <p:ph type="title"/>
+          </p:nvPr>
+        </p:nvSpPr>
+        <p:spPr/>
+        <p:txBody>
+          <a:bodyPr/>
+          <a:lstStyle/>
+          <a:p>
+            <a:pPr algn="ctr"/>
+            <a:r>
+              <a:rPr lang="de-DE" dirty="0"/>
+              <a:t>„</a:t>
+            </a:r>
+            <a:r>
+              <a:rPr lang="de-DE" dirty="0" err="1"/>
+              <a:t>tesla</a:t>
+            </a:r>
+            <a:r>
+              <a:rPr lang="de-DE" dirty="0"/>
+              <a:t>“ </a:t>
+            </a:r>
+            <a:r>
+              <a:rPr lang="de-DE" dirty="0" err="1"/>
+              <a:t>preprocessing</a:t>
+            </a:r>
+            <a:endParaRPr lang="de-DE" dirty="0"/>
+          </a:p>
+        </p:txBody>
+      </p:sp>
+      <p:pic>
+        <p:nvPicPr>
+          <p:cNvPr id="5" name="Inhaltsplatzhalter 4">
+            <a:extLst>
+              <a:ext uri="{FF2B5EF4-FFF2-40B4-BE49-F238E27FC236}">
+                <a16:creationId xmlns:a16="http://schemas.microsoft.com/office/drawing/2014/main" id="{3877A65E-B9B0-F549-846E-F7356017B5FE}"/>
+              </a:ext>
+            </a:extLst>
+          </p:cNvPr>
+          <p:cNvPicPr>
+            <a:picLocks noGrp="1"/>
+          </p:cNvPicPr>
+          <p:nvPr>
+            <p:ph idx="1"/>
+          </p:nvPr>
+        </p:nvPicPr>
+        <p:blipFill>
+          <a:blip r:embed="rId2"/>
+          <a:stretch>
+            <a:fillRect/>
+          </a:stretch>
+        </p:blipFill>
+        <p:spPr>
+          <a:xfrm>
+            <a:off x="3036000" y="1690688"/>
+            <a:ext cx="6120000" cy="4680000"/>
+          </a:xfrm>
+        </p:spPr>
+      </p:pic>
+    </p:spTree>
+    <p:extLst>
+      <p:ext uri="{BB962C8B-B14F-4D97-AF65-F5344CB8AC3E}">
+        <p14:creationId xmlns:p14="http://schemas.microsoft.com/office/powerpoint/2010/main" val="522655622"/>
+      </p:ext>
+    </p:extLst>
+  </p:cSld>
+  <p:clrMapOvr>
+    <a:masterClrMapping/>
+  </p:clrMapOvr>
+</p:sld>
+</file>
+
+<file path=ppt/slides/slide8.xml><?xml version="1.0" encoding="utf-8"?>
+<p:sld xmlns:a="http://schemas.openxmlformats.org/drawingml/2006/main" xmlns:r="http://schemas.openxmlformats.org/officeDocument/2006/relationships" xmlns:p="http://schemas.openxmlformats.org/presentationml/2006/main">
+  <p:cSld>
+    <p:spTree>
+      <p:nvGrpSpPr>
+        <p:cNvPr id="1" name=""/>
+        <p:cNvGrpSpPr/>
+        <p:nvPr/>
+      </p:nvGrpSpPr>
+      <p:grpSpPr>
+        <a:xfrm>
+          <a:off x="0" y="0"/>
+          <a:ext cx="0" cy="0"/>
+          <a:chOff x="0" y="0"/>
+          <a:chExt cx="0" cy="0"/>
+        </a:xfrm>
+      </p:grpSpPr>
+      <p:sp>
+        <p:nvSpPr>
+          <p:cNvPr id="2" name="Titel 1">
+            <a:extLst>
+              <a:ext uri="{FF2B5EF4-FFF2-40B4-BE49-F238E27FC236}">
+                <a16:creationId xmlns:a16="http://schemas.microsoft.com/office/drawing/2014/main" id="{0633365C-4E84-754E-BE30-273972E0B84D}"/>
+              </a:ext>
+            </a:extLst>
+          </p:cNvPr>
+          <p:cNvSpPr>
+            <a:spLocks noGrp="1"/>
+          </p:cNvSpPr>
+          <p:nvPr>
+            <p:ph type="title"/>
+          </p:nvPr>
+        </p:nvSpPr>
+        <p:spPr/>
+        <p:txBody>
+          <a:bodyPr/>
+          <a:lstStyle/>
+          <a:p>
+            <a:pPr algn="ctr"/>
+            <a:r>
+              <a:rPr lang="de-DE" dirty="0"/>
+              <a:t>„</a:t>
+            </a:r>
+            <a:r>
+              <a:rPr lang="de-DE" dirty="0" err="1"/>
+              <a:t>tesla</a:t>
+            </a:r>
+            <a:r>
+              <a:rPr lang="de-DE" dirty="0"/>
+              <a:t>“ </a:t>
+            </a:r>
+            <a:r>
+              <a:rPr lang="de-DE" dirty="0" err="1"/>
+              <a:t>preprocessing</a:t>
+            </a:r>
+            <a:endParaRPr lang="de-DE" dirty="0"/>
+          </a:p>
+        </p:txBody>
+      </p:sp>
+      <p:pic>
+        <p:nvPicPr>
+          <p:cNvPr id="5" name="Inhaltsplatzhalter 4">
+            <a:extLst>
+              <a:ext uri="{FF2B5EF4-FFF2-40B4-BE49-F238E27FC236}">
+                <a16:creationId xmlns:a16="http://schemas.microsoft.com/office/drawing/2014/main" id="{B51E5030-7A77-1A40-931D-9B7C1C711FEF}"/>
+              </a:ext>
+            </a:extLst>
+          </p:cNvPr>
+          <p:cNvPicPr>
+            <a:picLocks noGrp="1"/>
+          </p:cNvPicPr>
+          <p:nvPr>
+            <p:ph idx="1"/>
+          </p:nvPr>
+        </p:nvPicPr>
+        <p:blipFill>
+          <a:blip r:embed="rId2"/>
+          <a:stretch>
+            <a:fillRect/>
+          </a:stretch>
+        </p:blipFill>
+        <p:spPr>
+          <a:xfrm>
+            <a:off x="2881342" y="1690688"/>
+            <a:ext cx="6120000" cy="4680000"/>
+          </a:xfrm>
+        </p:spPr>
+      </p:pic>
+    </p:spTree>
+    <p:extLst>
+      <p:ext uri="{BB962C8B-B14F-4D97-AF65-F5344CB8AC3E}">
+        <p14:creationId xmlns:p14="http://schemas.microsoft.com/office/powerpoint/2010/main" val="3475780182"/>
+      </p:ext>
+    </p:extLst>
+  </p:cSld>
+  <p:clrMapOvr>
+    <a:masterClrMapping/>
+  </p:clrMapOvr>
+</p:sld>
+</file>
+
+<file path=ppt/slides/slide9.xml><?xml version="1.0" encoding="utf-8"?>
+<p:sld xmlns:a="http://schemas.openxmlformats.org/drawingml/2006/main" xmlns:r="http://schemas.openxmlformats.org/officeDocument/2006/relationships" xmlns:p="http://schemas.openxmlformats.org/presentationml/2006/main">
+  <p:cSld>
+    <p:spTree>
+      <p:nvGrpSpPr>
+        <p:cNvPr id="1" name=""/>
+        <p:cNvGrpSpPr/>
+        <p:nvPr/>
+      </p:nvGrpSpPr>
+      <p:grpSpPr>
+        <a:xfrm>
+          <a:off x="0" y="0"/>
+          <a:ext cx="0" cy="0"/>
+          <a:chOff x="0" y="0"/>
+          <a:chExt cx="0" cy="0"/>
+        </a:xfrm>
+      </p:grpSpPr>
+      <p:sp>
+        <p:nvSpPr>
+          <p:cNvPr id="2" name="Titel 1">
+            <a:extLst>
+              <a:ext uri="{FF2B5EF4-FFF2-40B4-BE49-F238E27FC236}">
+                <a16:creationId xmlns:a16="http://schemas.microsoft.com/office/drawing/2014/main" id="{5F16DBB9-E274-2047-9AE5-0334B0E842B0}"/>
+              </a:ext>
+            </a:extLst>
+          </p:cNvPr>
+          <p:cNvSpPr>
+            <a:spLocks noGrp="1"/>
+          </p:cNvSpPr>
+          <p:nvPr>
+            <p:ph type="title"/>
+          </p:nvPr>
+        </p:nvSpPr>
+        <p:spPr/>
+        <p:txBody>
+          <a:bodyPr/>
+          <a:lstStyle/>
+          <a:p>
+            <a:pPr algn="ctr"/>
+            <a:r>
+              <a:rPr lang="de-DE" dirty="0"/>
+              <a:t>„</a:t>
+            </a:r>
+            <a:r>
+              <a:rPr lang="de-DE" dirty="0" err="1"/>
+              <a:t>tesla</a:t>
+            </a:r>
+            <a:r>
+              <a:rPr lang="de-DE" dirty="0"/>
+              <a:t>“ </a:t>
+            </a:r>
+            <a:r>
+              <a:rPr lang="de-DE" dirty="0" err="1"/>
+              <a:t>preprocessing</a:t>
+            </a:r>
+            <a:endParaRPr lang="de-DE" dirty="0"/>
+          </a:p>
+        </p:txBody>
+      </p:sp>
+      <p:pic>
+        <p:nvPicPr>
+          <p:cNvPr id="7" name="Inhaltsplatzhalter 6">
+            <a:extLst>
+              <a:ext uri="{FF2B5EF4-FFF2-40B4-BE49-F238E27FC236}">
+                <a16:creationId xmlns:a16="http://schemas.microsoft.com/office/drawing/2014/main" id="{6EE579F2-3357-D240-98C4-B5FAE2E05905}"/>
+              </a:ext>
+            </a:extLst>
+          </p:cNvPr>
+          <p:cNvPicPr>
+            <a:picLocks noGrp="1"/>
+          </p:cNvPicPr>
+          <p:nvPr>
+            <p:ph idx="1"/>
+          </p:nvPr>
+        </p:nvPicPr>
+        <p:blipFill>
+          <a:blip r:embed="rId2"/>
+          <a:stretch>
+            <a:fillRect/>
+          </a:stretch>
+        </p:blipFill>
+        <p:spPr>
+          <a:xfrm>
+            <a:off x="2885895" y="1690688"/>
+            <a:ext cx="6120000" cy="4680000"/>
+          </a:xfrm>
+        </p:spPr>
+      </p:pic>
+    </p:spTree>
+    <p:extLst>
+      <p:ext uri="{BB962C8B-B14F-4D97-AF65-F5344CB8AC3E}">
+        <p14:creationId xmlns:p14="http://schemas.microsoft.com/office/powerpoint/2010/main" val="2585355535"/>
+      </p:ext>
+    </p:extLst>
+  </p:cSld>
+  <p:clrMapOvr>
+    <a:masterClrMapping/>
+  </p:clrMapOvr>
+</p:sld>
+</file>
+
 <file path=ppt/theme/theme1.xml><?xml version="1.0" encoding="utf-8"?>
 <a:theme xmlns:a="http://schemas.openxmlformats.org/drawingml/2006/main" name="Office">
   <a:themeElements>

</xml_diff>